<commit_message>
adding the blender files and updating the documentation
</commit_message>
<xml_diff>
--- a/PlanesAndShips/docs/ProjectDocumentation.pptx
+++ b/PlanesAndShips/docs/ProjectDocumentation.pptx
@@ -5,21 +5,29 @@
     <p:sldMasterId id="2147483648" r:id="rId4"/>
   </p:sldMasterIdLst>
   <p:notesMasterIdLst>
-    <p:notesMasterId r:id="rId14"/>
+    <p:notesMasterId r:id="rId22"/>
   </p:notesMasterIdLst>
   <p:handoutMasterIdLst>
-    <p:handoutMasterId r:id="rId15"/>
+    <p:handoutMasterId r:id="rId23"/>
   </p:handoutMasterIdLst>
   <p:sldIdLst>
     <p:sldId id="258" r:id="rId5"/>
     <p:sldId id="261" r:id="rId6"/>
     <p:sldId id="264" r:id="rId7"/>
     <p:sldId id="259" r:id="rId8"/>
-    <p:sldId id="260" r:id="rId9"/>
-    <p:sldId id="262" r:id="rId10"/>
-    <p:sldId id="263" r:id="rId11"/>
-    <p:sldId id="265" r:id="rId12"/>
-    <p:sldId id="257" r:id="rId13"/>
+    <p:sldId id="266" r:id="rId9"/>
+    <p:sldId id="267" r:id="rId10"/>
+    <p:sldId id="268" r:id="rId11"/>
+    <p:sldId id="269" r:id="rId12"/>
+    <p:sldId id="271" r:id="rId13"/>
+    <p:sldId id="270" r:id="rId14"/>
+    <p:sldId id="272" r:id="rId15"/>
+    <p:sldId id="273" r:id="rId16"/>
+    <p:sldId id="262" r:id="rId17"/>
+    <p:sldId id="260" r:id="rId18"/>
+    <p:sldId id="263" r:id="rId19"/>
+    <p:sldId id="265" r:id="rId20"/>
+    <p:sldId id="257" r:id="rId21"/>
   </p:sldIdLst>
   <p:sldSz cx="12192000" cy="6858000"/>
   <p:notesSz cx="6858000" cy="9144000"/>
@@ -5237,7 +5245,7 @@
             <a:pPr rtl="0"/>
             <a:fld id="{E74A1035-8F00-4EEB-B9C9-E943DCEB4BDB}" type="datetime1">
               <a:rPr lang="de-DE" smtClean="0"/>
-              <a:t>11.07.2022</a:t>
+              <a:t>20.06.2023</a:t>
             </a:fld>
             <a:endParaRPr lang="de-DE" dirty="0"/>
           </a:p>
@@ -5419,7 +5427,7 @@
             <a:pPr rtl="0"/>
             <a:fld id="{CA9E6DEB-429B-4B22-B452-0DBD8F042FF5}" type="datetime1">
               <a:rPr lang="de-DE" noProof="0" smtClean="0"/>
-              <a:t>11.07.2022</a:t>
+              <a:t>20.06.2023</a:t>
             </a:fld>
             <a:endParaRPr lang="de-DE" noProof="0" dirty="0"/>
           </a:p>
@@ -5756,7 +5764,7 @@
             <a:pPr rtl="0"/>
             <a:fld id="{57D1EDB5-B54C-40F7-AED3-6FEDBDE3068F}" type="slidenum">
               <a:rPr lang="de-DE" smtClean="0"/>
-              <a:t>9</a:t>
+              <a:t>17</a:t>
             </a:fld>
             <a:endParaRPr lang="de-DE" dirty="0"/>
           </a:p>
@@ -5846,7 +5854,7 @@
             <a:pPr rtl="0"/>
             <a:fld id="{DFA41115-531E-4370-8F5F-63608AE9F763}" type="datetime1">
               <a:rPr lang="de-DE" noProof="0" smtClean="0"/>
-              <a:t>11.07.2022</a:t>
+              <a:t>20.06.2023</a:t>
             </a:fld>
             <a:endParaRPr lang="de-DE" noProof="0" dirty="0"/>
           </a:p>
@@ -6091,7 +6099,7 @@
             <a:pPr rtl="0"/>
             <a:fld id="{EBD7C5AD-4BE3-461F-BD2B-073C92291DC5}" type="datetime1">
               <a:rPr lang="de-DE" noProof="0" smtClean="0"/>
-              <a:t>11.07.2022</a:t>
+              <a:t>20.06.2023</a:t>
             </a:fld>
             <a:endParaRPr lang="de-DE" noProof="0" dirty="0"/>
           </a:p>
@@ -6550,7 +6558,574 @@
 </p:sld>
 </file>
 
-<file path=ppt/slides/slide2.xml><?xml version="1.0" encoding="utf-8"?>
+<file path=ppt/slides/slide10.xml><?xml version="1.0" encoding="utf-8"?>
+<p:sld xmlns:a="http://schemas.openxmlformats.org/drawingml/2006/main" xmlns:r="http://schemas.openxmlformats.org/officeDocument/2006/relationships" xmlns:p="http://schemas.openxmlformats.org/presentationml/2006/main">
+  <p:cSld>
+    <p:spTree>
+      <p:nvGrpSpPr>
+        <p:cNvPr id="1" name=""/>
+        <p:cNvGrpSpPr/>
+        <p:nvPr/>
+      </p:nvGrpSpPr>
+      <p:grpSpPr>
+        <a:xfrm>
+          <a:off x="0" y="0"/>
+          <a:ext cx="0" cy="0"/>
+          <a:chOff x="0" y="0"/>
+          <a:chExt cx="0" cy="0"/>
+        </a:xfrm>
+      </p:grpSpPr>
+      <p:sp>
+        <p:nvSpPr>
+          <p:cNvPr id="2" name="Titel 1">
+            <a:extLst>
+              <a:ext uri="{FF2B5EF4-FFF2-40B4-BE49-F238E27FC236}">
+                <a16:creationId xmlns:a16="http://schemas.microsoft.com/office/drawing/2014/main" id="{223780BF-E12E-4750-AC6F-003FA8740E76}"/>
+              </a:ext>
+            </a:extLst>
+          </p:cNvPr>
+          <p:cNvSpPr>
+            <a:spLocks noGrp="1"/>
+          </p:cNvSpPr>
+          <p:nvPr>
+            <p:ph type="title"/>
+          </p:nvPr>
+        </p:nvSpPr>
+        <p:spPr/>
+        <p:txBody>
+          <a:bodyPr/>
+          <a:lstStyle/>
+          <a:p>
+            <a:r>
+              <a:rPr lang="en-US" dirty="0"/>
+              <a:t>Game Actors: active actors</a:t>
+            </a:r>
+          </a:p>
+        </p:txBody>
+      </p:sp>
+      <p:sp>
+        <p:nvSpPr>
+          <p:cNvPr id="3" name="Textfeld 2">
+            <a:extLst>
+              <a:ext uri="{FF2B5EF4-FFF2-40B4-BE49-F238E27FC236}">
+                <a16:creationId xmlns:a16="http://schemas.microsoft.com/office/drawing/2014/main" id="{6DCDB52F-6AEA-4604-8C97-B6A751357E8F}"/>
+              </a:ext>
+            </a:extLst>
+          </p:cNvPr>
+          <p:cNvSpPr txBox="1"/>
+          <p:nvPr/>
+        </p:nvSpPr>
+        <p:spPr>
+          <a:xfrm>
+            <a:off x="483765" y="1377709"/>
+            <a:ext cx="6091176" cy="2031325"/>
+          </a:xfrm>
+          <a:prstGeom prst="rect">
+            <a:avLst/>
+          </a:prstGeom>
+          <a:noFill/>
+        </p:spPr>
+        <p:txBody>
+          <a:bodyPr wrap="square" rtlCol="0">
+            <a:spAutoFit/>
+          </a:bodyPr>
+          <a:lstStyle/>
+          <a:p>
+            <a:r>
+              <a:rPr lang="en-US" dirty="0"/>
+              <a:t>The following categories are the “</a:t>
+            </a:r>
+            <a:r>
+              <a:rPr lang="en-US" i="1" dirty="0">
+                <a:solidFill>
+                  <a:srgbClr val="00B050"/>
+                </a:solidFill>
+              </a:rPr>
+              <a:t>active actors</a:t>
+            </a:r>
+            <a:r>
+              <a:rPr lang="en-US" dirty="0"/>
+              <a:t>”:</a:t>
+            </a:r>
+          </a:p>
+          <a:p>
+            <a:pPr marL="285750" indent="-285750">
+              <a:buFontTx/>
+              <a:buChar char="-"/>
+            </a:pPr>
+            <a:r>
+              <a:rPr lang="en-US" dirty="0"/>
+              <a:t>Tanks</a:t>
+            </a:r>
+          </a:p>
+          <a:p>
+            <a:pPr marL="285750" indent="-285750">
+              <a:buFontTx/>
+              <a:buChar char="-"/>
+            </a:pPr>
+            <a:r>
+              <a:rPr lang="en-US" dirty="0"/>
+              <a:t>Rocket/missile launchers</a:t>
+            </a:r>
+          </a:p>
+          <a:p>
+            <a:pPr marL="285750" indent="-285750">
+              <a:buFontTx/>
+              <a:buChar char="-"/>
+            </a:pPr>
+            <a:r>
+              <a:rPr lang="en-US" dirty="0"/>
+              <a:t>Ships</a:t>
+            </a:r>
+          </a:p>
+          <a:p>
+            <a:pPr marL="285750" indent="-285750">
+              <a:buFontTx/>
+              <a:buChar char="-"/>
+            </a:pPr>
+            <a:r>
+              <a:rPr lang="en-US" dirty="0"/>
+              <a:t>Airplanes</a:t>
+            </a:r>
+          </a:p>
+          <a:p>
+            <a:pPr marL="285750" indent="-285750">
+              <a:buFontTx/>
+              <a:buChar char="-"/>
+            </a:pPr>
+            <a:r>
+              <a:rPr lang="en-US" dirty="0"/>
+              <a:t>Radars and anti missile launchers</a:t>
+            </a:r>
+          </a:p>
+          <a:p>
+            <a:pPr marL="342900" indent="-342900">
+              <a:buAutoNum type="arabicPeriod"/>
+            </a:pPr>
+            <a:endParaRPr lang="en-US" dirty="0"/>
+          </a:p>
+        </p:txBody>
+      </p:sp>
+      <p:pic>
+        <p:nvPicPr>
+          <p:cNvPr id="4" name="Grafik 3">
+            <a:extLst>
+              <a:ext uri="{FF2B5EF4-FFF2-40B4-BE49-F238E27FC236}">
+                <a16:creationId xmlns:a16="http://schemas.microsoft.com/office/drawing/2014/main" id="{6943921D-4247-4D71-B647-A3C6272636A6}"/>
+              </a:ext>
+            </a:extLst>
+          </p:cNvPr>
+          <p:cNvPicPr>
+            <a:picLocks noChangeAspect="1"/>
+          </p:cNvPicPr>
+          <p:nvPr/>
+        </p:nvPicPr>
+        <p:blipFill>
+          <a:blip r:embed="rId2"/>
+          <a:stretch>
+            <a:fillRect/>
+          </a:stretch>
+        </p:blipFill>
+        <p:spPr>
+          <a:xfrm>
+            <a:off x="8029300" y="1765659"/>
+            <a:ext cx="5" cy="8"/>
+          </a:xfrm>
+          <a:prstGeom prst="rect">
+            <a:avLst/>
+          </a:prstGeom>
+        </p:spPr>
+      </p:pic>
+    </p:spTree>
+    <p:extLst>
+      <p:ext uri="{BB962C8B-B14F-4D97-AF65-F5344CB8AC3E}">
+        <p14:creationId xmlns:p14="http://schemas.microsoft.com/office/powerpoint/2010/main" val="3796180266"/>
+      </p:ext>
+    </p:extLst>
+  </p:cSld>
+  <p:clrMapOvr>
+    <a:masterClrMapping/>
+  </p:clrMapOvr>
+</p:sld>
+</file>
+
+<file path=ppt/slides/slide11.xml><?xml version="1.0" encoding="utf-8"?>
+<p:sld xmlns:a="http://schemas.openxmlformats.org/drawingml/2006/main" xmlns:r="http://schemas.openxmlformats.org/officeDocument/2006/relationships" xmlns:p="http://schemas.openxmlformats.org/presentationml/2006/main">
+  <p:cSld>
+    <p:spTree>
+      <p:nvGrpSpPr>
+        <p:cNvPr id="1" name=""/>
+        <p:cNvGrpSpPr/>
+        <p:nvPr/>
+      </p:nvGrpSpPr>
+      <p:grpSpPr>
+        <a:xfrm>
+          <a:off x="0" y="0"/>
+          <a:ext cx="0" cy="0"/>
+          <a:chOff x="0" y="0"/>
+          <a:chExt cx="0" cy="0"/>
+        </a:xfrm>
+      </p:grpSpPr>
+      <p:sp>
+        <p:nvSpPr>
+          <p:cNvPr id="2" name="Titel 1">
+            <a:extLst>
+              <a:ext uri="{FF2B5EF4-FFF2-40B4-BE49-F238E27FC236}">
+                <a16:creationId xmlns:a16="http://schemas.microsoft.com/office/drawing/2014/main" id="{FCD5F9FF-D75D-4F13-83F9-85858510022E}"/>
+              </a:ext>
+            </a:extLst>
+          </p:cNvPr>
+          <p:cNvSpPr>
+            <a:spLocks noGrp="1"/>
+          </p:cNvSpPr>
+          <p:nvPr>
+            <p:ph type="title"/>
+          </p:nvPr>
+        </p:nvSpPr>
+        <p:spPr/>
+        <p:txBody>
+          <a:bodyPr/>
+          <a:lstStyle/>
+          <a:p>
+            <a:r>
+              <a:rPr lang="en-US" dirty="0"/>
+              <a:t>Game Actors: active actors: tanks</a:t>
+            </a:r>
+          </a:p>
+        </p:txBody>
+      </p:sp>
+      <p:sp>
+        <p:nvSpPr>
+          <p:cNvPr id="3" name="Textfeld 2">
+            <a:extLst>
+              <a:ext uri="{FF2B5EF4-FFF2-40B4-BE49-F238E27FC236}">
+                <a16:creationId xmlns:a16="http://schemas.microsoft.com/office/drawing/2014/main" id="{6FE74840-8406-4208-AC34-C0AEF3BC43B2}"/>
+              </a:ext>
+            </a:extLst>
+          </p:cNvPr>
+          <p:cNvSpPr txBox="1"/>
+          <p:nvPr/>
+        </p:nvSpPr>
+        <p:spPr>
+          <a:xfrm>
+            <a:off x="483764" y="1377709"/>
+            <a:ext cx="7432327" cy="3416320"/>
+          </a:xfrm>
+          <a:prstGeom prst="rect">
+            <a:avLst/>
+          </a:prstGeom>
+          <a:noFill/>
+        </p:spPr>
+        <p:txBody>
+          <a:bodyPr wrap="square" rtlCol="0">
+            <a:spAutoFit/>
+          </a:bodyPr>
+          <a:lstStyle/>
+          <a:p>
+            <a:r>
+              <a:rPr lang="en-US" dirty="0"/>
+              <a:t>The tank has the following characteristics / features / parts:</a:t>
+            </a:r>
+          </a:p>
+          <a:p>
+            <a:pPr marL="285750" indent="-285750">
+              <a:buFontTx/>
+              <a:buChar char="-"/>
+            </a:pPr>
+            <a:r>
+              <a:rPr lang="en-US" dirty="0"/>
+              <a:t>Tanks have a body-chassis with:</a:t>
+            </a:r>
+          </a:p>
+          <a:p>
+            <a:pPr marL="742950" lvl="1" indent="-285750">
+              <a:buFontTx/>
+              <a:buChar char="-"/>
+            </a:pPr>
+            <a:r>
+              <a:rPr lang="en-US" dirty="0"/>
+              <a:t>Main body chassis</a:t>
+            </a:r>
+          </a:p>
+          <a:p>
+            <a:pPr marL="742950" lvl="1" indent="-285750">
+              <a:buFontTx/>
+              <a:buChar char="-"/>
+            </a:pPr>
+            <a:r>
+              <a:rPr lang="en-US" dirty="0"/>
+              <a:t>Tracks and/or wheels to move and steer</a:t>
+            </a:r>
+          </a:p>
+          <a:p>
+            <a:pPr marL="742950" lvl="1" indent="-285750">
+              <a:buFontTx/>
+              <a:buChar char="-"/>
+            </a:pPr>
+            <a:r>
+              <a:rPr lang="en-US" dirty="0"/>
+              <a:t>Lights with ON/OFF materials</a:t>
+            </a:r>
+          </a:p>
+          <a:p>
+            <a:pPr marL="285750" indent="-285750">
+              <a:buFontTx/>
+              <a:buChar char="-"/>
+            </a:pPr>
+            <a:r>
+              <a:rPr lang="en-US" dirty="0"/>
+              <a:t>Tank has a body-turret with one or two main guns with:</a:t>
+            </a:r>
+          </a:p>
+          <a:p>
+            <a:pPr marL="742950" lvl="1" indent="-285750">
+              <a:buFontTx/>
+              <a:buChar char="-"/>
+            </a:pPr>
+            <a:r>
+              <a:rPr lang="en-US" dirty="0">
+                <a:highlight>
+                  <a:srgbClr val="FFFF00"/>
+                </a:highlight>
+              </a:rPr>
+              <a:t>TBD</a:t>
+            </a:r>
+          </a:p>
+          <a:p>
+            <a:endParaRPr lang="en-US" dirty="0"/>
+          </a:p>
+          <a:p>
+            <a:r>
+              <a:rPr lang="en-US" dirty="0"/>
+              <a:t>Tank main characteristics:</a:t>
+            </a:r>
+          </a:p>
+          <a:p>
+            <a:r>
+              <a:rPr lang="en-US" dirty="0"/>
+              <a:t>- A tank must have a center of rotation common for all components to make possible to rotate individual components against the same single point of rotation. While using in Blender the “join” feature this must be </a:t>
+            </a:r>
+            <a:r>
+              <a:rPr lang="en-US"/>
+              <a:t>kept in mind.</a:t>
+            </a:r>
+            <a:endParaRPr lang="en-US" dirty="0"/>
+          </a:p>
+        </p:txBody>
+      </p:sp>
+      <p:pic>
+        <p:nvPicPr>
+          <p:cNvPr id="4" name="Grafik 3">
+            <a:extLst>
+              <a:ext uri="{FF2B5EF4-FFF2-40B4-BE49-F238E27FC236}">
+                <a16:creationId xmlns:a16="http://schemas.microsoft.com/office/drawing/2014/main" id="{1B4EAC4A-0A0B-4788-935B-D88D4117DC05}"/>
+              </a:ext>
+            </a:extLst>
+          </p:cNvPr>
+          <p:cNvPicPr>
+            <a:picLocks noChangeAspect="1"/>
+          </p:cNvPicPr>
+          <p:nvPr/>
+        </p:nvPicPr>
+        <p:blipFill>
+          <a:blip r:embed="rId2"/>
+          <a:stretch>
+            <a:fillRect/>
+          </a:stretch>
+        </p:blipFill>
+        <p:spPr>
+          <a:xfrm>
+            <a:off x="8245053" y="3429000"/>
+            <a:ext cx="3232630" cy="2283337"/>
+          </a:xfrm>
+          <a:prstGeom prst="rect">
+            <a:avLst/>
+          </a:prstGeom>
+        </p:spPr>
+      </p:pic>
+      <p:cxnSp>
+        <p:nvCxnSpPr>
+          <p:cNvPr id="6" name="Gerade Verbindung mit Pfeil 5">
+            <a:extLst>
+              <a:ext uri="{FF2B5EF4-FFF2-40B4-BE49-F238E27FC236}">
+                <a16:creationId xmlns:a16="http://schemas.microsoft.com/office/drawing/2014/main" id="{545FF5A5-AABF-4645-8E33-4DA42EE7AF55}"/>
+              </a:ext>
+            </a:extLst>
+          </p:cNvPr>
+          <p:cNvCxnSpPr/>
+          <p:nvPr/>
+        </p:nvCxnSpPr>
+        <p:spPr>
+          <a:xfrm>
+            <a:off x="7611291" y="4284617"/>
+            <a:ext cx="2250077" cy="174172"/>
+          </a:xfrm>
+          <a:prstGeom prst="straightConnector1">
+            <a:avLst/>
+          </a:prstGeom>
+          <a:ln>
+            <a:tailEnd type="triangle"/>
+          </a:ln>
+        </p:spPr>
+        <p:style>
+          <a:lnRef idx="1">
+            <a:schemeClr val="accent1"/>
+          </a:lnRef>
+          <a:fillRef idx="0">
+            <a:schemeClr val="accent1"/>
+          </a:fillRef>
+          <a:effectRef idx="0">
+            <a:schemeClr val="accent1"/>
+          </a:effectRef>
+          <a:fontRef idx="minor">
+            <a:schemeClr val="tx1"/>
+          </a:fontRef>
+        </p:style>
+      </p:cxnSp>
+    </p:spTree>
+    <p:extLst>
+      <p:ext uri="{BB962C8B-B14F-4D97-AF65-F5344CB8AC3E}">
+        <p14:creationId xmlns:p14="http://schemas.microsoft.com/office/powerpoint/2010/main" val="2968966697"/>
+      </p:ext>
+    </p:extLst>
+  </p:cSld>
+  <p:clrMapOvr>
+    <a:masterClrMapping/>
+  </p:clrMapOvr>
+</p:sld>
+</file>
+
+<file path=ppt/slides/slide12.xml><?xml version="1.0" encoding="utf-8"?>
+<p:sld xmlns:a="http://schemas.openxmlformats.org/drawingml/2006/main" xmlns:r="http://schemas.openxmlformats.org/officeDocument/2006/relationships" xmlns:p="http://schemas.openxmlformats.org/presentationml/2006/main">
+  <p:cSld>
+    <p:spTree>
+      <p:nvGrpSpPr>
+        <p:cNvPr id="1" name=""/>
+        <p:cNvGrpSpPr/>
+        <p:nvPr/>
+      </p:nvGrpSpPr>
+      <p:grpSpPr>
+        <a:xfrm>
+          <a:off x="0" y="0"/>
+          <a:ext cx="0" cy="0"/>
+          <a:chOff x="0" y="0"/>
+          <a:chExt cx="0" cy="0"/>
+        </a:xfrm>
+      </p:grpSpPr>
+      <p:sp>
+        <p:nvSpPr>
+          <p:cNvPr id="2" name="Titel 1">
+            <a:extLst>
+              <a:ext uri="{FF2B5EF4-FFF2-40B4-BE49-F238E27FC236}">
+                <a16:creationId xmlns:a16="http://schemas.microsoft.com/office/drawing/2014/main" id="{FCD5F9FF-D75D-4F13-83F9-85858510022E}"/>
+              </a:ext>
+            </a:extLst>
+          </p:cNvPr>
+          <p:cNvSpPr>
+            <a:spLocks noGrp="1"/>
+          </p:cNvSpPr>
+          <p:nvPr>
+            <p:ph type="title"/>
+          </p:nvPr>
+        </p:nvSpPr>
+        <p:spPr/>
+        <p:txBody>
+          <a:bodyPr/>
+          <a:lstStyle/>
+          <a:p>
+            <a:r>
+              <a:rPr lang="en-US" dirty="0"/>
+              <a:t>Game Actors: active actors: tank chassis</a:t>
+            </a:r>
+          </a:p>
+        </p:txBody>
+      </p:sp>
+      <p:sp>
+        <p:nvSpPr>
+          <p:cNvPr id="3" name="Textfeld 2">
+            <a:extLst>
+              <a:ext uri="{FF2B5EF4-FFF2-40B4-BE49-F238E27FC236}">
+                <a16:creationId xmlns:a16="http://schemas.microsoft.com/office/drawing/2014/main" id="{6FE74840-8406-4208-AC34-C0AEF3BC43B2}"/>
+              </a:ext>
+            </a:extLst>
+          </p:cNvPr>
+          <p:cNvSpPr txBox="1"/>
+          <p:nvPr/>
+        </p:nvSpPr>
+        <p:spPr>
+          <a:xfrm>
+            <a:off x="483764" y="1377709"/>
+            <a:ext cx="7432327" cy="1754326"/>
+          </a:xfrm>
+          <a:prstGeom prst="rect">
+            <a:avLst/>
+          </a:prstGeom>
+          <a:noFill/>
+        </p:spPr>
+        <p:txBody>
+          <a:bodyPr wrap="square" rtlCol="0">
+            <a:spAutoFit/>
+          </a:bodyPr>
+          <a:lstStyle/>
+          <a:p>
+            <a:r>
+              <a:rPr lang="en-US" dirty="0"/>
+              <a:t>The tank chassis have the following components:</a:t>
+            </a:r>
+          </a:p>
+          <a:p>
+            <a:pPr marL="342900" indent="-342900">
+              <a:buFont typeface="+mj-lt"/>
+              <a:buAutoNum type="arabicPeriod"/>
+            </a:pPr>
+            <a:r>
+              <a:rPr lang="en-US" dirty="0"/>
+              <a:t>Main body chassis with own material(s) that are fixed during the game</a:t>
+            </a:r>
+          </a:p>
+          <a:p>
+            <a:pPr marL="342900" indent="-342900">
+              <a:buFont typeface="+mj-lt"/>
+              <a:buAutoNum type="arabicPeriod"/>
+            </a:pPr>
+            <a:r>
+              <a:rPr lang="en-US" dirty="0"/>
+              <a:t>Tracks and/or wheels with materials that may change in between to simulate the rotation/movement</a:t>
+            </a:r>
+          </a:p>
+          <a:p>
+            <a:pPr marL="342900" indent="-342900">
+              <a:buFont typeface="+mj-lt"/>
+              <a:buAutoNum type="arabicPeriod"/>
+            </a:pPr>
+            <a:r>
+              <a:rPr lang="en-US" dirty="0"/>
+              <a:t>Lights with ON/OFF materials </a:t>
+            </a:r>
+          </a:p>
+          <a:p>
+            <a:pPr marL="342900" indent="-342900">
+              <a:buFont typeface="+mj-lt"/>
+              <a:buAutoNum type="arabicPeriod"/>
+            </a:pPr>
+            <a:endParaRPr lang="en-US" dirty="0"/>
+          </a:p>
+        </p:txBody>
+      </p:sp>
+    </p:spTree>
+    <p:extLst>
+      <p:ext uri="{BB962C8B-B14F-4D97-AF65-F5344CB8AC3E}">
+        <p14:creationId xmlns:p14="http://schemas.microsoft.com/office/powerpoint/2010/main" val="553174154"/>
+      </p:ext>
+    </p:extLst>
+  </p:cSld>
+  <p:clrMapOvr>
+    <a:masterClrMapping/>
+  </p:clrMapOvr>
+</p:sld>
+</file>
+
+<file path=ppt/slides/slide13.xml><?xml version="1.0" encoding="utf-8"?>
 <p:sld xmlns:a="http://schemas.openxmlformats.org/drawingml/2006/main" xmlns:r="http://schemas.openxmlformats.org/officeDocument/2006/relationships" xmlns:p="http://schemas.openxmlformats.org/presentationml/2006/main">
   <p:cSld>
     <p:spTree>
@@ -6591,65 +7166,7 @@
             <a:pPr algn="ctr"/>
             <a:r>
               <a:rPr lang="en-US" dirty="0"/>
-              <a:t>Game concept</a:t>
-            </a:r>
-          </a:p>
-        </p:txBody>
-      </p:sp>
-      <p:sp>
-        <p:nvSpPr>
-          <p:cNvPr id="13" name="Rechteck 12">
-            <a:extLst>
-              <a:ext uri="{FF2B5EF4-FFF2-40B4-BE49-F238E27FC236}">
-                <a16:creationId xmlns:a16="http://schemas.microsoft.com/office/drawing/2014/main" id="{E3052AEA-7091-4EF1-9CE8-61C98EDCAC3A}"/>
-              </a:ext>
-            </a:extLst>
-          </p:cNvPr>
-          <p:cNvSpPr/>
-          <p:nvPr/>
-        </p:nvSpPr>
-        <p:spPr>
-          <a:xfrm>
-            <a:off x="975360" y="1529584"/>
-            <a:ext cx="10276114" cy="923330"/>
-          </a:xfrm>
-          <a:prstGeom prst="rect">
-            <a:avLst/>
-          </a:prstGeom>
-        </p:spPr>
-        <p:txBody>
-          <a:bodyPr wrap="square">
-            <a:spAutoFit/>
-          </a:bodyPr>
-          <a:lstStyle/>
-          <a:p>
-            <a:pPr marL="342900" indent="-342900">
-              <a:buFont typeface="+mj-lt"/>
-              <a:buAutoNum type="arabicPeriod"/>
-            </a:pPr>
-            <a:r>
-              <a:rPr lang="en-US" dirty="0"/>
-              <a:t>The map</a:t>
-            </a:r>
-          </a:p>
-          <a:p>
-            <a:pPr marL="800100" lvl="1" indent="-342900">
-              <a:buFont typeface="Arial" panose="020B0604020202020204" pitchFamily="34" charset="0"/>
-              <a:buChar char="•"/>
-            </a:pPr>
-            <a:r>
-              <a:rPr lang="en-US" dirty="0"/>
-              <a:t>Map concept</a:t>
-            </a:r>
-          </a:p>
-          <a:p>
-            <a:pPr marL="800100" lvl="1" indent="-342900">
-              <a:buFont typeface="Arial" panose="020B0604020202020204" pitchFamily="34" charset="0"/>
-              <a:buChar char="•"/>
-            </a:pPr>
-            <a:r>
-              <a:rPr lang="en-US" dirty="0"/>
-              <a:t>Map tile</a:t>
+              <a:t>Class diagrams</a:t>
             </a:r>
           </a:p>
         </p:txBody>
@@ -6657,7 +7174,7 @@
     </p:spTree>
     <p:extLst>
       <p:ext uri="{BB962C8B-B14F-4D97-AF65-F5344CB8AC3E}">
-        <p14:creationId xmlns:p14="http://schemas.microsoft.com/office/powerpoint/2010/main" val="851610666"/>
+        <p14:creationId xmlns:p14="http://schemas.microsoft.com/office/powerpoint/2010/main" val="866057793"/>
       </p:ext>
     </p:extLst>
   </p:cSld>
@@ -6667,516 +7184,7 @@
 </p:sld>
 </file>
 
-<file path=ppt/slides/slide3.xml><?xml version="1.0" encoding="utf-8"?>
-<p:sld xmlns:a="http://schemas.openxmlformats.org/drawingml/2006/main" xmlns:r="http://schemas.openxmlformats.org/officeDocument/2006/relationships" xmlns:p="http://schemas.openxmlformats.org/presentationml/2006/main">
-  <p:cSld>
-    <p:spTree>
-      <p:nvGrpSpPr>
-        <p:cNvPr id="1" name=""/>
-        <p:cNvGrpSpPr/>
-        <p:nvPr/>
-      </p:nvGrpSpPr>
-      <p:grpSpPr>
-        <a:xfrm>
-          <a:off x="0" y="0"/>
-          <a:ext cx="0" cy="0"/>
-          <a:chOff x="0" y="0"/>
-          <a:chExt cx="0" cy="0"/>
-        </a:xfrm>
-      </p:grpSpPr>
-      <p:sp>
-        <p:nvSpPr>
-          <p:cNvPr id="2" name="Titel 1">
-            <a:extLst>
-              <a:ext uri="{FF2B5EF4-FFF2-40B4-BE49-F238E27FC236}">
-                <a16:creationId xmlns:a16="http://schemas.microsoft.com/office/drawing/2014/main" id="{6CF6C096-7FFB-4E59-B1B0-25EBD8AFE167}"/>
-              </a:ext>
-            </a:extLst>
-          </p:cNvPr>
-          <p:cNvSpPr>
-            <a:spLocks noGrp="1"/>
-          </p:cNvSpPr>
-          <p:nvPr>
-            <p:ph type="title"/>
-          </p:nvPr>
-        </p:nvSpPr>
-        <p:spPr/>
-        <p:txBody>
-          <a:bodyPr/>
-          <a:lstStyle/>
-          <a:p>
-            <a:pPr algn="ctr"/>
-            <a:r>
-              <a:rPr lang="en-US" dirty="0"/>
-              <a:t>The map</a:t>
-            </a:r>
-          </a:p>
-        </p:txBody>
-      </p:sp>
-    </p:spTree>
-    <p:extLst>
-      <p:ext uri="{BB962C8B-B14F-4D97-AF65-F5344CB8AC3E}">
-        <p14:creationId xmlns:p14="http://schemas.microsoft.com/office/powerpoint/2010/main" val="2831940003"/>
-      </p:ext>
-    </p:extLst>
-  </p:cSld>
-  <p:clrMapOvr>
-    <a:masterClrMapping/>
-  </p:clrMapOvr>
-</p:sld>
-</file>
-
-<file path=ppt/slides/slide4.xml><?xml version="1.0" encoding="utf-8"?>
-<p:sld xmlns:a="http://schemas.openxmlformats.org/drawingml/2006/main" xmlns:r="http://schemas.openxmlformats.org/officeDocument/2006/relationships" xmlns:p="http://schemas.openxmlformats.org/presentationml/2006/main">
-  <p:cSld>
-    <p:spTree>
-      <p:nvGrpSpPr>
-        <p:cNvPr id="1" name=""/>
-        <p:cNvGrpSpPr/>
-        <p:nvPr/>
-      </p:nvGrpSpPr>
-      <p:grpSpPr>
-        <a:xfrm>
-          <a:off x="0" y="0"/>
-          <a:ext cx="0" cy="0"/>
-          <a:chOff x="0" y="0"/>
-          <a:chExt cx="0" cy="0"/>
-        </a:xfrm>
-      </p:grpSpPr>
-      <p:sp>
-        <p:nvSpPr>
-          <p:cNvPr id="2" name="Titel 1">
-            <a:extLst>
-              <a:ext uri="{FF2B5EF4-FFF2-40B4-BE49-F238E27FC236}">
-                <a16:creationId xmlns:a16="http://schemas.microsoft.com/office/drawing/2014/main" id="{223780BF-E12E-4750-AC6F-003FA8740E76}"/>
-              </a:ext>
-            </a:extLst>
-          </p:cNvPr>
-          <p:cNvSpPr>
-            <a:spLocks noGrp="1"/>
-          </p:cNvSpPr>
-          <p:nvPr>
-            <p:ph type="title"/>
-          </p:nvPr>
-        </p:nvSpPr>
-        <p:spPr/>
-        <p:txBody>
-          <a:bodyPr/>
-          <a:lstStyle/>
-          <a:p>
-            <a:r>
-              <a:rPr lang="en-US" dirty="0"/>
-              <a:t>Map concept</a:t>
-            </a:r>
-          </a:p>
-        </p:txBody>
-      </p:sp>
-      <p:sp>
-        <p:nvSpPr>
-          <p:cNvPr id="3" name="Textfeld 2">
-            <a:extLst>
-              <a:ext uri="{FF2B5EF4-FFF2-40B4-BE49-F238E27FC236}">
-                <a16:creationId xmlns:a16="http://schemas.microsoft.com/office/drawing/2014/main" id="{6DCDB52F-6AEA-4604-8C97-B6A751357E8F}"/>
-              </a:ext>
-            </a:extLst>
-          </p:cNvPr>
-          <p:cNvSpPr txBox="1"/>
-          <p:nvPr/>
-        </p:nvSpPr>
-        <p:spPr>
-          <a:xfrm>
-            <a:off x="483765" y="1377709"/>
-            <a:ext cx="11224470" cy="1200329"/>
-          </a:xfrm>
-          <a:prstGeom prst="rect">
-            <a:avLst/>
-          </a:prstGeom>
-          <a:noFill/>
-        </p:spPr>
-        <p:txBody>
-          <a:bodyPr wrap="square" rtlCol="0">
-            <a:spAutoFit/>
-          </a:bodyPr>
-          <a:lstStyle/>
-          <a:p>
-            <a:r>
-              <a:rPr lang="en-US" dirty="0"/>
-              <a:t>The map is composed by </a:t>
-            </a:r>
-            <a:r>
-              <a:rPr lang="en-US" i="1" dirty="0">
-                <a:solidFill>
-                  <a:schemeClr val="accent2"/>
-                </a:solidFill>
-              </a:rPr>
-              <a:t>map tiles </a:t>
-            </a:r>
-            <a:r>
-              <a:rPr lang="en-US" dirty="0"/>
-              <a:t>each tile shall be able to host some passive elements (trees, landscape parts, buildings, </a:t>
-            </a:r>
-            <a:r>
-              <a:rPr lang="en-US" dirty="0" err="1"/>
-              <a:t>etc</a:t>
-            </a:r>
-            <a:r>
-              <a:rPr lang="en-US" dirty="0"/>
-              <a:t>) as well as active elements (game actors: tanks, planes, ships).</a:t>
-            </a:r>
-          </a:p>
-          <a:p>
-            <a:r>
-              <a:rPr lang="en-US" dirty="0"/>
-              <a:t>The map will have two sides: left player side and the right player side (the right one is usually covered by “fog of war” and it is the “enemy” side)</a:t>
-            </a:r>
-          </a:p>
-        </p:txBody>
-      </p:sp>
-      <p:pic>
-        <p:nvPicPr>
-          <p:cNvPr id="4" name="Grafik 3">
-            <a:extLst>
-              <a:ext uri="{FF2B5EF4-FFF2-40B4-BE49-F238E27FC236}">
-                <a16:creationId xmlns:a16="http://schemas.microsoft.com/office/drawing/2014/main" id="{288B7860-6704-43EB-94B4-E007C859D55F}"/>
-              </a:ext>
-            </a:extLst>
-          </p:cNvPr>
-          <p:cNvPicPr>
-            <a:picLocks noChangeAspect="1"/>
-          </p:cNvPicPr>
-          <p:nvPr/>
-        </p:nvPicPr>
-        <p:blipFill>
-          <a:blip r:embed="rId2"/>
-          <a:stretch>
-            <a:fillRect/>
-          </a:stretch>
-        </p:blipFill>
-        <p:spPr>
-          <a:xfrm>
-            <a:off x="570451" y="2822968"/>
-            <a:ext cx="9972675" cy="2828925"/>
-          </a:xfrm>
-          <a:prstGeom prst="rect">
-            <a:avLst/>
-          </a:prstGeom>
-        </p:spPr>
-      </p:pic>
-      <p:cxnSp>
-        <p:nvCxnSpPr>
-          <p:cNvPr id="6" name="Gerade Verbindung mit Pfeil 5">
-            <a:extLst>
-              <a:ext uri="{FF2B5EF4-FFF2-40B4-BE49-F238E27FC236}">
-                <a16:creationId xmlns:a16="http://schemas.microsoft.com/office/drawing/2014/main" id="{FD7671C8-C5D0-4DCA-9B3C-35B35D555CF4}"/>
-              </a:ext>
-            </a:extLst>
-          </p:cNvPr>
-          <p:cNvCxnSpPr>
-            <a:cxnSpLocks/>
-            <a:endCxn id="7" idx="0"/>
-          </p:cNvCxnSpPr>
-          <p:nvPr/>
-        </p:nvCxnSpPr>
-        <p:spPr>
-          <a:xfrm>
-            <a:off x="1208015" y="5478011"/>
-            <a:ext cx="125835" cy="629175"/>
-          </a:xfrm>
-          <a:prstGeom prst="straightConnector1">
-            <a:avLst/>
-          </a:prstGeom>
-          <a:ln>
-            <a:tailEnd type="triangle"/>
-          </a:ln>
-        </p:spPr>
-        <p:style>
-          <a:lnRef idx="1">
-            <a:schemeClr val="accent1"/>
-          </a:lnRef>
-          <a:fillRef idx="0">
-            <a:schemeClr val="accent1"/>
-          </a:fillRef>
-          <a:effectRef idx="0">
-            <a:schemeClr val="accent1"/>
-          </a:effectRef>
-          <a:fontRef idx="minor">
-            <a:schemeClr val="tx1"/>
-          </a:fontRef>
-        </p:style>
-      </p:cxnSp>
-      <p:sp>
-        <p:nvSpPr>
-          <p:cNvPr id="7" name="Textfeld 6">
-            <a:extLst>
-              <a:ext uri="{FF2B5EF4-FFF2-40B4-BE49-F238E27FC236}">
-                <a16:creationId xmlns:a16="http://schemas.microsoft.com/office/drawing/2014/main" id="{36924832-B5C8-413F-9FFB-B9CB28F03ADD}"/>
-              </a:ext>
-            </a:extLst>
-          </p:cNvPr>
-          <p:cNvSpPr txBox="1"/>
-          <p:nvPr/>
-        </p:nvSpPr>
-        <p:spPr>
-          <a:xfrm>
-            <a:off x="738231" y="6107186"/>
-            <a:ext cx="1191237" cy="369332"/>
-          </a:xfrm>
-          <a:prstGeom prst="rect">
-            <a:avLst/>
-          </a:prstGeom>
-          <a:noFill/>
-        </p:spPr>
-        <p:txBody>
-          <a:bodyPr wrap="square" rtlCol="0">
-            <a:spAutoFit/>
-          </a:bodyPr>
-          <a:lstStyle/>
-          <a:p>
-            <a:r>
-              <a:rPr lang="en-US" dirty="0"/>
-              <a:t>Map tile</a:t>
-            </a:r>
-          </a:p>
-        </p:txBody>
-      </p:sp>
-      <p:sp>
-        <p:nvSpPr>
-          <p:cNvPr id="9" name="Textfeld 8">
-            <a:extLst>
-              <a:ext uri="{FF2B5EF4-FFF2-40B4-BE49-F238E27FC236}">
-                <a16:creationId xmlns:a16="http://schemas.microsoft.com/office/drawing/2014/main" id="{06B8E90F-DB50-4836-BE6F-A385DE5AD53D}"/>
-              </a:ext>
-            </a:extLst>
-          </p:cNvPr>
-          <p:cNvSpPr txBox="1"/>
-          <p:nvPr/>
-        </p:nvSpPr>
-        <p:spPr>
-          <a:xfrm>
-            <a:off x="2274815" y="6123760"/>
-            <a:ext cx="1191237" cy="646331"/>
-          </a:xfrm>
-          <a:prstGeom prst="rect">
-            <a:avLst/>
-          </a:prstGeom>
-          <a:noFill/>
-        </p:spPr>
-        <p:txBody>
-          <a:bodyPr wrap="square" rtlCol="0">
-            <a:spAutoFit/>
-          </a:bodyPr>
-          <a:lstStyle/>
-          <a:p>
-            <a:r>
-              <a:rPr lang="en-US" dirty="0"/>
-              <a:t>Passive elements</a:t>
-            </a:r>
-          </a:p>
-        </p:txBody>
-      </p:sp>
-      <p:cxnSp>
-        <p:nvCxnSpPr>
-          <p:cNvPr id="11" name="Gerade Verbindung mit Pfeil 10">
-            <a:extLst>
-              <a:ext uri="{FF2B5EF4-FFF2-40B4-BE49-F238E27FC236}">
-                <a16:creationId xmlns:a16="http://schemas.microsoft.com/office/drawing/2014/main" id="{CC3FF899-5005-43AA-833A-84CA209D6422}"/>
-              </a:ext>
-            </a:extLst>
-          </p:cNvPr>
-          <p:cNvCxnSpPr>
-            <a:endCxn id="9" idx="0"/>
-          </p:cNvCxnSpPr>
-          <p:nvPr/>
-        </p:nvCxnSpPr>
-        <p:spPr>
-          <a:xfrm>
-            <a:off x="2274815" y="5083729"/>
-            <a:ext cx="595619" cy="1040031"/>
-          </a:xfrm>
-          <a:prstGeom prst="straightConnector1">
-            <a:avLst/>
-          </a:prstGeom>
-          <a:ln>
-            <a:tailEnd type="triangle"/>
-          </a:ln>
-        </p:spPr>
-        <p:style>
-          <a:lnRef idx="1">
-            <a:schemeClr val="accent1"/>
-          </a:lnRef>
-          <a:fillRef idx="0">
-            <a:schemeClr val="accent1"/>
-          </a:fillRef>
-          <a:effectRef idx="0">
-            <a:schemeClr val="accent1"/>
-          </a:effectRef>
-          <a:fontRef idx="minor">
-            <a:schemeClr val="tx1"/>
-          </a:fontRef>
-        </p:style>
-      </p:cxnSp>
-      <p:cxnSp>
-        <p:nvCxnSpPr>
-          <p:cNvPr id="13" name="Gerade Verbindung mit Pfeil 12">
-            <a:extLst>
-              <a:ext uri="{FF2B5EF4-FFF2-40B4-BE49-F238E27FC236}">
-                <a16:creationId xmlns:a16="http://schemas.microsoft.com/office/drawing/2014/main" id="{F4CED20D-C8F8-4961-9A05-9EF8A97C8BB8}"/>
-              </a:ext>
-            </a:extLst>
-          </p:cNvPr>
-          <p:cNvCxnSpPr>
-            <a:endCxn id="9" idx="0"/>
-          </p:cNvCxnSpPr>
-          <p:nvPr/>
-        </p:nvCxnSpPr>
-        <p:spPr>
-          <a:xfrm flipH="1">
-            <a:off x="2870434" y="5234730"/>
-            <a:ext cx="292216" cy="889030"/>
-          </a:xfrm>
-          <a:prstGeom prst="straightConnector1">
-            <a:avLst/>
-          </a:prstGeom>
-          <a:ln>
-            <a:tailEnd type="triangle"/>
-          </a:ln>
-        </p:spPr>
-        <p:style>
-          <a:lnRef idx="1">
-            <a:schemeClr val="accent1"/>
-          </a:lnRef>
-          <a:fillRef idx="0">
-            <a:schemeClr val="accent1"/>
-          </a:fillRef>
-          <a:effectRef idx="0">
-            <a:schemeClr val="accent1"/>
-          </a:effectRef>
-          <a:fontRef idx="minor">
-            <a:schemeClr val="tx1"/>
-          </a:fontRef>
-        </p:style>
-      </p:cxnSp>
-      <p:pic>
-        <p:nvPicPr>
-          <p:cNvPr id="14" name="Grafik 13">
-            <a:extLst>
-              <a:ext uri="{FF2B5EF4-FFF2-40B4-BE49-F238E27FC236}">
-                <a16:creationId xmlns:a16="http://schemas.microsoft.com/office/drawing/2014/main" id="{38D76158-7BCD-4799-97AB-56FBEA24DC2B}"/>
-              </a:ext>
-            </a:extLst>
-          </p:cNvPr>
-          <p:cNvPicPr>
-            <a:picLocks noChangeAspect="1"/>
-          </p:cNvPicPr>
-          <p:nvPr/>
-        </p:nvPicPr>
-        <p:blipFill>
-          <a:blip r:embed="rId3"/>
-          <a:stretch>
-            <a:fillRect/>
-          </a:stretch>
-        </p:blipFill>
-        <p:spPr>
-          <a:xfrm>
-            <a:off x="3755934" y="4714817"/>
-            <a:ext cx="566299" cy="305932"/>
-          </a:xfrm>
-          <a:prstGeom prst="rect">
-            <a:avLst/>
-          </a:prstGeom>
-        </p:spPr>
-      </p:pic>
-      <p:sp>
-        <p:nvSpPr>
-          <p:cNvPr id="15" name="Textfeld 14">
-            <a:extLst>
-              <a:ext uri="{FF2B5EF4-FFF2-40B4-BE49-F238E27FC236}">
-                <a16:creationId xmlns:a16="http://schemas.microsoft.com/office/drawing/2014/main" id="{2E9A45CD-AACA-4B85-A85E-650CD31FB331}"/>
-              </a:ext>
-            </a:extLst>
-          </p:cNvPr>
-          <p:cNvSpPr txBox="1"/>
-          <p:nvPr/>
-        </p:nvSpPr>
-        <p:spPr>
-          <a:xfrm>
-            <a:off x="4188903" y="6123760"/>
-            <a:ext cx="1191237" cy="646331"/>
-          </a:xfrm>
-          <a:prstGeom prst="rect">
-            <a:avLst/>
-          </a:prstGeom>
-          <a:noFill/>
-        </p:spPr>
-        <p:txBody>
-          <a:bodyPr wrap="square" rtlCol="0">
-            <a:spAutoFit/>
-          </a:bodyPr>
-          <a:lstStyle/>
-          <a:p>
-            <a:r>
-              <a:rPr lang="en-US" dirty="0"/>
-              <a:t>Active element</a:t>
-            </a:r>
-          </a:p>
-        </p:txBody>
-      </p:sp>
-      <p:cxnSp>
-        <p:nvCxnSpPr>
-          <p:cNvPr id="17" name="Gerade Verbindung mit Pfeil 16">
-            <a:extLst>
-              <a:ext uri="{FF2B5EF4-FFF2-40B4-BE49-F238E27FC236}">
-                <a16:creationId xmlns:a16="http://schemas.microsoft.com/office/drawing/2014/main" id="{C8BBA4AA-C63E-4E58-B58E-97F23B054AB4}"/>
-              </a:ext>
-            </a:extLst>
-          </p:cNvPr>
-          <p:cNvCxnSpPr>
-            <a:stCxn id="14" idx="2"/>
-            <a:endCxn id="15" idx="0"/>
-          </p:cNvCxnSpPr>
-          <p:nvPr/>
-        </p:nvCxnSpPr>
-        <p:spPr>
-          <a:xfrm>
-            <a:off x="4039084" y="5020749"/>
-            <a:ext cx="745438" cy="1103011"/>
-          </a:xfrm>
-          <a:prstGeom prst="straightConnector1">
-            <a:avLst/>
-          </a:prstGeom>
-          <a:ln>
-            <a:tailEnd type="triangle"/>
-          </a:ln>
-        </p:spPr>
-        <p:style>
-          <a:lnRef idx="1">
-            <a:schemeClr val="accent1"/>
-          </a:lnRef>
-          <a:fillRef idx="0">
-            <a:schemeClr val="accent1"/>
-          </a:fillRef>
-          <a:effectRef idx="0">
-            <a:schemeClr val="accent1"/>
-          </a:effectRef>
-          <a:fontRef idx="minor">
-            <a:schemeClr val="tx1"/>
-          </a:fontRef>
-        </p:style>
-      </p:cxnSp>
-    </p:spTree>
-    <p:extLst>
-      <p:ext uri="{BB962C8B-B14F-4D97-AF65-F5344CB8AC3E}">
-        <p14:creationId xmlns:p14="http://schemas.microsoft.com/office/powerpoint/2010/main" val="1034573549"/>
-      </p:ext>
-    </p:extLst>
-  </p:cSld>
-  <p:clrMapOvr>
-    <a:masterClrMapping/>
-  </p:clrMapOvr>
-</p:sld>
-</file>
-
-<file path=ppt/slides/slide5.xml><?xml version="1.0" encoding="utf-8"?>
+<file path=ppt/slides/slide14.xml><?xml version="1.0" encoding="utf-8"?>
 <p:sld xmlns:a="http://schemas.openxmlformats.org/drawingml/2006/main" xmlns:r="http://schemas.openxmlformats.org/officeDocument/2006/relationships" xmlns:p="http://schemas.openxmlformats.org/presentationml/2006/main">
   <p:cSld>
     <p:spTree>
@@ -8263,66 +8271,7 @@
 </p:sld>
 </file>
 
-<file path=ppt/slides/slide6.xml><?xml version="1.0" encoding="utf-8"?>
-<p:sld xmlns:a="http://schemas.openxmlformats.org/drawingml/2006/main" xmlns:r="http://schemas.openxmlformats.org/officeDocument/2006/relationships" xmlns:p="http://schemas.openxmlformats.org/presentationml/2006/main">
-  <p:cSld>
-    <p:spTree>
-      <p:nvGrpSpPr>
-        <p:cNvPr id="1" name=""/>
-        <p:cNvGrpSpPr/>
-        <p:nvPr/>
-      </p:nvGrpSpPr>
-      <p:grpSpPr>
-        <a:xfrm>
-          <a:off x="0" y="0"/>
-          <a:ext cx="0" cy="0"/>
-          <a:chOff x="0" y="0"/>
-          <a:chExt cx="0" cy="0"/>
-        </a:xfrm>
-      </p:grpSpPr>
-      <p:sp>
-        <p:nvSpPr>
-          <p:cNvPr id="2" name="Titel 1">
-            <a:extLst>
-              <a:ext uri="{FF2B5EF4-FFF2-40B4-BE49-F238E27FC236}">
-                <a16:creationId xmlns:a16="http://schemas.microsoft.com/office/drawing/2014/main" id="{6CF6C096-7FFB-4E59-B1B0-25EBD8AFE167}"/>
-              </a:ext>
-            </a:extLst>
-          </p:cNvPr>
-          <p:cNvSpPr>
-            <a:spLocks noGrp="1"/>
-          </p:cNvSpPr>
-          <p:nvPr>
-            <p:ph type="title"/>
-          </p:nvPr>
-        </p:nvSpPr>
-        <p:spPr/>
-        <p:txBody>
-          <a:bodyPr/>
-          <a:lstStyle/>
-          <a:p>
-            <a:pPr algn="ctr"/>
-            <a:r>
-              <a:rPr lang="en-US" dirty="0"/>
-              <a:t>Class diagrams</a:t>
-            </a:r>
-          </a:p>
-        </p:txBody>
-      </p:sp>
-    </p:spTree>
-    <p:extLst>
-      <p:ext uri="{BB962C8B-B14F-4D97-AF65-F5344CB8AC3E}">
-        <p14:creationId xmlns:p14="http://schemas.microsoft.com/office/powerpoint/2010/main" val="866057793"/>
-      </p:ext>
-    </p:extLst>
-  </p:cSld>
-  <p:clrMapOvr>
-    <a:masterClrMapping/>
-  </p:clrMapOvr>
-</p:sld>
-</file>
-
-<file path=ppt/slides/slide7.xml><?xml version="1.0" encoding="utf-8"?>
+<file path=ppt/slides/slide15.xml><?xml version="1.0" encoding="utf-8"?>
 <p:sld xmlns:a="http://schemas.openxmlformats.org/drawingml/2006/main" xmlns:r="http://schemas.openxmlformats.org/officeDocument/2006/relationships" xmlns:p="http://schemas.openxmlformats.org/presentationml/2006/main">
   <p:cSld>
     <p:spTree>
@@ -8906,7 +8855,7 @@
 </p:sld>
 </file>
 
-<file path=ppt/slides/slide8.xml><?xml version="1.0" encoding="utf-8"?>
+<file path=ppt/slides/slide16.xml><?xml version="1.0" encoding="utf-8"?>
 <p:sld xmlns:a="http://schemas.openxmlformats.org/drawingml/2006/main" xmlns:r="http://schemas.openxmlformats.org/officeDocument/2006/relationships" xmlns:p="http://schemas.openxmlformats.org/presentationml/2006/main">
   <p:cSld>
     <p:spTree>
@@ -9942,7 +9891,7 @@
 </p:sld>
 </file>
 
-<file path=ppt/slides/slide9.xml><?xml version="1.0" encoding="utf-8"?>
+<file path=ppt/slides/slide17.xml><?xml version="1.0" encoding="utf-8"?>
 <p:sld xmlns:a="http://schemas.openxmlformats.org/drawingml/2006/main" xmlns:r="http://schemas.openxmlformats.org/officeDocument/2006/relationships" xmlns:p="http://schemas.openxmlformats.org/presentationml/2006/main">
   <p:cSld>
     <p:spTree>
@@ -10020,6 +9969,1664 @@
     <p:extLst>
       <p:ext uri="{BB962C8B-B14F-4D97-AF65-F5344CB8AC3E}">
         <p14:creationId xmlns:p14="http://schemas.microsoft.com/office/powerpoint/2010/main" val="715057958"/>
+      </p:ext>
+    </p:extLst>
+  </p:cSld>
+  <p:clrMapOvr>
+    <a:masterClrMapping/>
+  </p:clrMapOvr>
+</p:sld>
+</file>
+
+<file path=ppt/slides/slide2.xml><?xml version="1.0" encoding="utf-8"?>
+<p:sld xmlns:a="http://schemas.openxmlformats.org/drawingml/2006/main" xmlns:r="http://schemas.openxmlformats.org/officeDocument/2006/relationships" xmlns:p="http://schemas.openxmlformats.org/presentationml/2006/main">
+  <p:cSld>
+    <p:spTree>
+      <p:nvGrpSpPr>
+        <p:cNvPr id="1" name=""/>
+        <p:cNvGrpSpPr/>
+        <p:nvPr/>
+      </p:nvGrpSpPr>
+      <p:grpSpPr>
+        <a:xfrm>
+          <a:off x="0" y="0"/>
+          <a:ext cx="0" cy="0"/>
+          <a:chOff x="0" y="0"/>
+          <a:chExt cx="0" cy="0"/>
+        </a:xfrm>
+      </p:grpSpPr>
+      <p:sp>
+        <p:nvSpPr>
+          <p:cNvPr id="2" name="Titel 1">
+            <a:extLst>
+              <a:ext uri="{FF2B5EF4-FFF2-40B4-BE49-F238E27FC236}">
+                <a16:creationId xmlns:a16="http://schemas.microsoft.com/office/drawing/2014/main" id="{6CF6C096-7FFB-4E59-B1B0-25EBD8AFE167}"/>
+              </a:ext>
+            </a:extLst>
+          </p:cNvPr>
+          <p:cNvSpPr>
+            <a:spLocks noGrp="1"/>
+          </p:cNvSpPr>
+          <p:nvPr>
+            <p:ph type="title"/>
+          </p:nvPr>
+        </p:nvSpPr>
+        <p:spPr/>
+        <p:txBody>
+          <a:bodyPr/>
+          <a:lstStyle/>
+          <a:p>
+            <a:pPr algn="ctr"/>
+            <a:r>
+              <a:rPr lang="en-US" dirty="0"/>
+              <a:t>Game concept</a:t>
+            </a:r>
+          </a:p>
+        </p:txBody>
+      </p:sp>
+      <p:sp>
+        <p:nvSpPr>
+          <p:cNvPr id="13" name="Rechteck 12">
+            <a:extLst>
+              <a:ext uri="{FF2B5EF4-FFF2-40B4-BE49-F238E27FC236}">
+                <a16:creationId xmlns:a16="http://schemas.microsoft.com/office/drawing/2014/main" id="{E3052AEA-7091-4EF1-9CE8-61C98EDCAC3A}"/>
+              </a:ext>
+            </a:extLst>
+          </p:cNvPr>
+          <p:cNvSpPr/>
+          <p:nvPr/>
+        </p:nvSpPr>
+        <p:spPr>
+          <a:xfrm>
+            <a:off x="975360" y="1529584"/>
+            <a:ext cx="10276114" cy="2308324"/>
+          </a:xfrm>
+          <a:prstGeom prst="rect">
+            <a:avLst/>
+          </a:prstGeom>
+        </p:spPr>
+        <p:txBody>
+          <a:bodyPr wrap="square">
+            <a:spAutoFit/>
+          </a:bodyPr>
+          <a:lstStyle/>
+          <a:p>
+            <a:pPr marL="342900" indent="-342900">
+              <a:buFont typeface="+mj-lt"/>
+              <a:buAutoNum type="arabicPeriod"/>
+            </a:pPr>
+            <a:r>
+              <a:rPr lang="en-US" dirty="0"/>
+              <a:t>The map</a:t>
+            </a:r>
+          </a:p>
+          <a:p>
+            <a:pPr marL="800100" lvl="1" indent="-342900">
+              <a:buFont typeface="Arial" panose="020B0604020202020204" pitchFamily="34" charset="0"/>
+              <a:buChar char="•"/>
+            </a:pPr>
+            <a:r>
+              <a:rPr lang="en-US" dirty="0"/>
+              <a:t>Map concept</a:t>
+            </a:r>
+          </a:p>
+          <a:p>
+            <a:pPr marL="800100" lvl="1" indent="-342900">
+              <a:buFont typeface="Arial" panose="020B0604020202020204" pitchFamily="34" charset="0"/>
+              <a:buChar char="•"/>
+            </a:pPr>
+            <a:r>
+              <a:rPr lang="en-US" dirty="0"/>
+              <a:t>Map tile</a:t>
+            </a:r>
+          </a:p>
+          <a:p>
+            <a:pPr marL="1257300" lvl="2" indent="-342900">
+              <a:buFont typeface="Arial" panose="020B0604020202020204" pitchFamily="34" charset="0"/>
+              <a:buChar char="•"/>
+            </a:pPr>
+            <a:r>
+              <a:rPr lang="en-US" dirty="0"/>
+              <a:t>Map tile types</a:t>
+            </a:r>
+          </a:p>
+          <a:p>
+            <a:pPr marL="342900" indent="-342900">
+              <a:buFont typeface="Arial" panose="020B0604020202020204" pitchFamily="34" charset="0"/>
+              <a:buChar char="•"/>
+            </a:pPr>
+            <a:r>
+              <a:rPr lang="en-US" dirty="0"/>
+              <a:t>Game Actors</a:t>
+            </a:r>
+          </a:p>
+          <a:p>
+            <a:pPr marL="800100" lvl="1" indent="-342900">
+              <a:buFont typeface="Arial" panose="020B0604020202020204" pitchFamily="34" charset="0"/>
+              <a:buChar char="•"/>
+            </a:pPr>
+            <a:r>
+              <a:rPr lang="en-US" dirty="0"/>
+              <a:t>Passive actors</a:t>
+            </a:r>
+          </a:p>
+          <a:p>
+            <a:pPr marL="800100" lvl="1" indent="-342900">
+              <a:buFont typeface="Arial" panose="020B0604020202020204" pitchFamily="34" charset="0"/>
+              <a:buChar char="•"/>
+            </a:pPr>
+            <a:r>
+              <a:rPr lang="en-US" dirty="0"/>
+              <a:t>Active actors</a:t>
+            </a:r>
+          </a:p>
+          <a:p>
+            <a:pPr marL="342900" indent="-342900">
+              <a:buFont typeface="Arial" panose="020B0604020202020204" pitchFamily="34" charset="0"/>
+              <a:buChar char="•"/>
+            </a:pPr>
+            <a:r>
+              <a:rPr lang="en-US" dirty="0"/>
+              <a:t>Class diagrams</a:t>
+            </a:r>
+          </a:p>
+        </p:txBody>
+      </p:sp>
+    </p:spTree>
+    <p:extLst>
+      <p:ext uri="{BB962C8B-B14F-4D97-AF65-F5344CB8AC3E}">
+        <p14:creationId xmlns:p14="http://schemas.microsoft.com/office/powerpoint/2010/main" val="851610666"/>
+      </p:ext>
+    </p:extLst>
+  </p:cSld>
+  <p:clrMapOvr>
+    <a:masterClrMapping/>
+  </p:clrMapOvr>
+</p:sld>
+</file>
+
+<file path=ppt/slides/slide3.xml><?xml version="1.0" encoding="utf-8"?>
+<p:sld xmlns:a="http://schemas.openxmlformats.org/drawingml/2006/main" xmlns:r="http://schemas.openxmlformats.org/officeDocument/2006/relationships" xmlns:p="http://schemas.openxmlformats.org/presentationml/2006/main">
+  <p:cSld>
+    <p:spTree>
+      <p:nvGrpSpPr>
+        <p:cNvPr id="1" name=""/>
+        <p:cNvGrpSpPr/>
+        <p:nvPr/>
+      </p:nvGrpSpPr>
+      <p:grpSpPr>
+        <a:xfrm>
+          <a:off x="0" y="0"/>
+          <a:ext cx="0" cy="0"/>
+          <a:chOff x="0" y="0"/>
+          <a:chExt cx="0" cy="0"/>
+        </a:xfrm>
+      </p:grpSpPr>
+      <p:sp>
+        <p:nvSpPr>
+          <p:cNvPr id="2" name="Titel 1">
+            <a:extLst>
+              <a:ext uri="{FF2B5EF4-FFF2-40B4-BE49-F238E27FC236}">
+                <a16:creationId xmlns:a16="http://schemas.microsoft.com/office/drawing/2014/main" id="{6CF6C096-7FFB-4E59-B1B0-25EBD8AFE167}"/>
+              </a:ext>
+            </a:extLst>
+          </p:cNvPr>
+          <p:cNvSpPr>
+            <a:spLocks noGrp="1"/>
+          </p:cNvSpPr>
+          <p:nvPr>
+            <p:ph type="title"/>
+          </p:nvPr>
+        </p:nvSpPr>
+        <p:spPr/>
+        <p:txBody>
+          <a:bodyPr/>
+          <a:lstStyle/>
+          <a:p>
+            <a:pPr algn="ctr"/>
+            <a:r>
+              <a:rPr lang="en-US" dirty="0"/>
+              <a:t>The map</a:t>
+            </a:r>
+          </a:p>
+        </p:txBody>
+      </p:sp>
+    </p:spTree>
+    <p:extLst>
+      <p:ext uri="{BB962C8B-B14F-4D97-AF65-F5344CB8AC3E}">
+        <p14:creationId xmlns:p14="http://schemas.microsoft.com/office/powerpoint/2010/main" val="2831940003"/>
+      </p:ext>
+    </p:extLst>
+  </p:cSld>
+  <p:clrMapOvr>
+    <a:masterClrMapping/>
+  </p:clrMapOvr>
+</p:sld>
+</file>
+
+<file path=ppt/slides/slide4.xml><?xml version="1.0" encoding="utf-8"?>
+<p:sld xmlns:a="http://schemas.openxmlformats.org/drawingml/2006/main" xmlns:r="http://schemas.openxmlformats.org/officeDocument/2006/relationships" xmlns:p="http://schemas.openxmlformats.org/presentationml/2006/main">
+  <p:cSld>
+    <p:spTree>
+      <p:nvGrpSpPr>
+        <p:cNvPr id="1" name=""/>
+        <p:cNvGrpSpPr/>
+        <p:nvPr/>
+      </p:nvGrpSpPr>
+      <p:grpSpPr>
+        <a:xfrm>
+          <a:off x="0" y="0"/>
+          <a:ext cx="0" cy="0"/>
+          <a:chOff x="0" y="0"/>
+          <a:chExt cx="0" cy="0"/>
+        </a:xfrm>
+      </p:grpSpPr>
+      <p:sp>
+        <p:nvSpPr>
+          <p:cNvPr id="2" name="Titel 1">
+            <a:extLst>
+              <a:ext uri="{FF2B5EF4-FFF2-40B4-BE49-F238E27FC236}">
+                <a16:creationId xmlns:a16="http://schemas.microsoft.com/office/drawing/2014/main" id="{223780BF-E12E-4750-AC6F-003FA8740E76}"/>
+              </a:ext>
+            </a:extLst>
+          </p:cNvPr>
+          <p:cNvSpPr>
+            <a:spLocks noGrp="1"/>
+          </p:cNvSpPr>
+          <p:nvPr>
+            <p:ph type="title"/>
+          </p:nvPr>
+        </p:nvSpPr>
+        <p:spPr/>
+        <p:txBody>
+          <a:bodyPr/>
+          <a:lstStyle/>
+          <a:p>
+            <a:r>
+              <a:rPr lang="en-US" dirty="0"/>
+              <a:t>Map concept</a:t>
+            </a:r>
+          </a:p>
+        </p:txBody>
+      </p:sp>
+      <p:sp>
+        <p:nvSpPr>
+          <p:cNvPr id="3" name="Textfeld 2">
+            <a:extLst>
+              <a:ext uri="{FF2B5EF4-FFF2-40B4-BE49-F238E27FC236}">
+                <a16:creationId xmlns:a16="http://schemas.microsoft.com/office/drawing/2014/main" id="{6DCDB52F-6AEA-4604-8C97-B6A751357E8F}"/>
+              </a:ext>
+            </a:extLst>
+          </p:cNvPr>
+          <p:cNvSpPr txBox="1"/>
+          <p:nvPr/>
+        </p:nvSpPr>
+        <p:spPr>
+          <a:xfrm>
+            <a:off x="483765" y="1377709"/>
+            <a:ext cx="11224470" cy="1200329"/>
+          </a:xfrm>
+          <a:prstGeom prst="rect">
+            <a:avLst/>
+          </a:prstGeom>
+          <a:noFill/>
+        </p:spPr>
+        <p:txBody>
+          <a:bodyPr wrap="square" rtlCol="0">
+            <a:spAutoFit/>
+          </a:bodyPr>
+          <a:lstStyle/>
+          <a:p>
+            <a:r>
+              <a:rPr lang="en-US" dirty="0"/>
+              <a:t>The map is composed by </a:t>
+            </a:r>
+            <a:r>
+              <a:rPr lang="en-US" i="1" dirty="0">
+                <a:solidFill>
+                  <a:schemeClr val="accent2"/>
+                </a:solidFill>
+              </a:rPr>
+              <a:t>map tiles </a:t>
+            </a:r>
+            <a:r>
+              <a:rPr lang="en-US" dirty="0"/>
+              <a:t>each tile shall be able to host some passive elements (trees, landscape parts, buildings, </a:t>
+            </a:r>
+            <a:r>
+              <a:rPr lang="en-US" dirty="0" err="1"/>
+              <a:t>etc</a:t>
+            </a:r>
+            <a:r>
+              <a:rPr lang="en-US" dirty="0"/>
+              <a:t>) as well as active elements (game actors: tanks, planes, ships).</a:t>
+            </a:r>
+          </a:p>
+          <a:p>
+            <a:r>
+              <a:rPr lang="en-US" dirty="0"/>
+              <a:t>The map will have two sides: left player side and the right player side (the right one is usually covered by “fog of war” and it is the “enemy” side)</a:t>
+            </a:r>
+          </a:p>
+        </p:txBody>
+      </p:sp>
+      <p:pic>
+        <p:nvPicPr>
+          <p:cNvPr id="4" name="Grafik 3">
+            <a:extLst>
+              <a:ext uri="{FF2B5EF4-FFF2-40B4-BE49-F238E27FC236}">
+                <a16:creationId xmlns:a16="http://schemas.microsoft.com/office/drawing/2014/main" id="{288B7860-6704-43EB-94B4-E007C859D55F}"/>
+              </a:ext>
+            </a:extLst>
+          </p:cNvPr>
+          <p:cNvPicPr>
+            <a:picLocks noChangeAspect="1"/>
+          </p:cNvPicPr>
+          <p:nvPr/>
+        </p:nvPicPr>
+        <p:blipFill>
+          <a:blip r:embed="rId2"/>
+          <a:stretch>
+            <a:fillRect/>
+          </a:stretch>
+        </p:blipFill>
+        <p:spPr>
+          <a:xfrm>
+            <a:off x="570451" y="2822968"/>
+            <a:ext cx="9972675" cy="2828925"/>
+          </a:xfrm>
+          <a:prstGeom prst="rect">
+            <a:avLst/>
+          </a:prstGeom>
+        </p:spPr>
+      </p:pic>
+      <p:cxnSp>
+        <p:nvCxnSpPr>
+          <p:cNvPr id="6" name="Gerade Verbindung mit Pfeil 5">
+            <a:extLst>
+              <a:ext uri="{FF2B5EF4-FFF2-40B4-BE49-F238E27FC236}">
+                <a16:creationId xmlns:a16="http://schemas.microsoft.com/office/drawing/2014/main" id="{FD7671C8-C5D0-4DCA-9B3C-35B35D555CF4}"/>
+              </a:ext>
+            </a:extLst>
+          </p:cNvPr>
+          <p:cNvCxnSpPr>
+            <a:cxnSpLocks/>
+            <a:endCxn id="7" idx="0"/>
+          </p:cNvCxnSpPr>
+          <p:nvPr/>
+        </p:nvCxnSpPr>
+        <p:spPr>
+          <a:xfrm>
+            <a:off x="1208015" y="5478011"/>
+            <a:ext cx="125835" cy="629175"/>
+          </a:xfrm>
+          <a:prstGeom prst="straightConnector1">
+            <a:avLst/>
+          </a:prstGeom>
+          <a:ln>
+            <a:tailEnd type="triangle"/>
+          </a:ln>
+        </p:spPr>
+        <p:style>
+          <a:lnRef idx="1">
+            <a:schemeClr val="accent1"/>
+          </a:lnRef>
+          <a:fillRef idx="0">
+            <a:schemeClr val="accent1"/>
+          </a:fillRef>
+          <a:effectRef idx="0">
+            <a:schemeClr val="accent1"/>
+          </a:effectRef>
+          <a:fontRef idx="minor">
+            <a:schemeClr val="tx1"/>
+          </a:fontRef>
+        </p:style>
+      </p:cxnSp>
+      <p:sp>
+        <p:nvSpPr>
+          <p:cNvPr id="7" name="Textfeld 6">
+            <a:extLst>
+              <a:ext uri="{FF2B5EF4-FFF2-40B4-BE49-F238E27FC236}">
+                <a16:creationId xmlns:a16="http://schemas.microsoft.com/office/drawing/2014/main" id="{36924832-B5C8-413F-9FFB-B9CB28F03ADD}"/>
+              </a:ext>
+            </a:extLst>
+          </p:cNvPr>
+          <p:cNvSpPr txBox="1"/>
+          <p:nvPr/>
+        </p:nvSpPr>
+        <p:spPr>
+          <a:xfrm>
+            <a:off x="738231" y="6107186"/>
+            <a:ext cx="1191237" cy="369332"/>
+          </a:xfrm>
+          <a:prstGeom prst="rect">
+            <a:avLst/>
+          </a:prstGeom>
+          <a:noFill/>
+        </p:spPr>
+        <p:txBody>
+          <a:bodyPr wrap="square" rtlCol="0">
+            <a:spAutoFit/>
+          </a:bodyPr>
+          <a:lstStyle/>
+          <a:p>
+            <a:r>
+              <a:rPr lang="en-US" dirty="0"/>
+              <a:t>Map tile</a:t>
+            </a:r>
+          </a:p>
+        </p:txBody>
+      </p:sp>
+      <p:sp>
+        <p:nvSpPr>
+          <p:cNvPr id="9" name="Textfeld 8">
+            <a:extLst>
+              <a:ext uri="{FF2B5EF4-FFF2-40B4-BE49-F238E27FC236}">
+                <a16:creationId xmlns:a16="http://schemas.microsoft.com/office/drawing/2014/main" id="{06B8E90F-DB50-4836-BE6F-A385DE5AD53D}"/>
+              </a:ext>
+            </a:extLst>
+          </p:cNvPr>
+          <p:cNvSpPr txBox="1"/>
+          <p:nvPr/>
+        </p:nvSpPr>
+        <p:spPr>
+          <a:xfrm>
+            <a:off x="2274815" y="6123760"/>
+            <a:ext cx="1191237" cy="646331"/>
+          </a:xfrm>
+          <a:prstGeom prst="rect">
+            <a:avLst/>
+          </a:prstGeom>
+          <a:noFill/>
+        </p:spPr>
+        <p:txBody>
+          <a:bodyPr wrap="square" rtlCol="0">
+            <a:spAutoFit/>
+          </a:bodyPr>
+          <a:lstStyle/>
+          <a:p>
+            <a:r>
+              <a:rPr lang="en-US" dirty="0"/>
+              <a:t>Passive elements</a:t>
+            </a:r>
+          </a:p>
+        </p:txBody>
+      </p:sp>
+      <p:cxnSp>
+        <p:nvCxnSpPr>
+          <p:cNvPr id="11" name="Gerade Verbindung mit Pfeil 10">
+            <a:extLst>
+              <a:ext uri="{FF2B5EF4-FFF2-40B4-BE49-F238E27FC236}">
+                <a16:creationId xmlns:a16="http://schemas.microsoft.com/office/drawing/2014/main" id="{CC3FF899-5005-43AA-833A-84CA209D6422}"/>
+              </a:ext>
+            </a:extLst>
+          </p:cNvPr>
+          <p:cNvCxnSpPr>
+            <a:endCxn id="9" idx="0"/>
+          </p:cNvCxnSpPr>
+          <p:nvPr/>
+        </p:nvCxnSpPr>
+        <p:spPr>
+          <a:xfrm>
+            <a:off x="2274815" y="5083729"/>
+            <a:ext cx="595619" cy="1040031"/>
+          </a:xfrm>
+          <a:prstGeom prst="straightConnector1">
+            <a:avLst/>
+          </a:prstGeom>
+          <a:ln>
+            <a:tailEnd type="triangle"/>
+          </a:ln>
+        </p:spPr>
+        <p:style>
+          <a:lnRef idx="1">
+            <a:schemeClr val="accent1"/>
+          </a:lnRef>
+          <a:fillRef idx="0">
+            <a:schemeClr val="accent1"/>
+          </a:fillRef>
+          <a:effectRef idx="0">
+            <a:schemeClr val="accent1"/>
+          </a:effectRef>
+          <a:fontRef idx="minor">
+            <a:schemeClr val="tx1"/>
+          </a:fontRef>
+        </p:style>
+      </p:cxnSp>
+      <p:cxnSp>
+        <p:nvCxnSpPr>
+          <p:cNvPr id="13" name="Gerade Verbindung mit Pfeil 12">
+            <a:extLst>
+              <a:ext uri="{FF2B5EF4-FFF2-40B4-BE49-F238E27FC236}">
+                <a16:creationId xmlns:a16="http://schemas.microsoft.com/office/drawing/2014/main" id="{F4CED20D-C8F8-4961-9A05-9EF8A97C8BB8}"/>
+              </a:ext>
+            </a:extLst>
+          </p:cNvPr>
+          <p:cNvCxnSpPr>
+            <a:endCxn id="9" idx="0"/>
+          </p:cNvCxnSpPr>
+          <p:nvPr/>
+        </p:nvCxnSpPr>
+        <p:spPr>
+          <a:xfrm flipH="1">
+            <a:off x="2870434" y="5234730"/>
+            <a:ext cx="292216" cy="889030"/>
+          </a:xfrm>
+          <a:prstGeom prst="straightConnector1">
+            <a:avLst/>
+          </a:prstGeom>
+          <a:ln>
+            <a:tailEnd type="triangle"/>
+          </a:ln>
+        </p:spPr>
+        <p:style>
+          <a:lnRef idx="1">
+            <a:schemeClr val="accent1"/>
+          </a:lnRef>
+          <a:fillRef idx="0">
+            <a:schemeClr val="accent1"/>
+          </a:fillRef>
+          <a:effectRef idx="0">
+            <a:schemeClr val="accent1"/>
+          </a:effectRef>
+          <a:fontRef idx="minor">
+            <a:schemeClr val="tx1"/>
+          </a:fontRef>
+        </p:style>
+      </p:cxnSp>
+      <p:pic>
+        <p:nvPicPr>
+          <p:cNvPr id="14" name="Grafik 13">
+            <a:extLst>
+              <a:ext uri="{FF2B5EF4-FFF2-40B4-BE49-F238E27FC236}">
+                <a16:creationId xmlns:a16="http://schemas.microsoft.com/office/drawing/2014/main" id="{38D76158-7BCD-4799-97AB-56FBEA24DC2B}"/>
+              </a:ext>
+            </a:extLst>
+          </p:cNvPr>
+          <p:cNvPicPr>
+            <a:picLocks noChangeAspect="1"/>
+          </p:cNvPicPr>
+          <p:nvPr/>
+        </p:nvPicPr>
+        <p:blipFill>
+          <a:blip r:embed="rId3"/>
+          <a:stretch>
+            <a:fillRect/>
+          </a:stretch>
+        </p:blipFill>
+        <p:spPr>
+          <a:xfrm>
+            <a:off x="3755934" y="4714817"/>
+            <a:ext cx="566299" cy="305932"/>
+          </a:xfrm>
+          <a:prstGeom prst="rect">
+            <a:avLst/>
+          </a:prstGeom>
+        </p:spPr>
+      </p:pic>
+      <p:sp>
+        <p:nvSpPr>
+          <p:cNvPr id="15" name="Textfeld 14">
+            <a:extLst>
+              <a:ext uri="{FF2B5EF4-FFF2-40B4-BE49-F238E27FC236}">
+                <a16:creationId xmlns:a16="http://schemas.microsoft.com/office/drawing/2014/main" id="{2E9A45CD-AACA-4B85-A85E-650CD31FB331}"/>
+              </a:ext>
+            </a:extLst>
+          </p:cNvPr>
+          <p:cNvSpPr txBox="1"/>
+          <p:nvPr/>
+        </p:nvSpPr>
+        <p:spPr>
+          <a:xfrm>
+            <a:off x="4021262" y="5884116"/>
+            <a:ext cx="1191237" cy="923330"/>
+          </a:xfrm>
+          <a:prstGeom prst="rect">
+            <a:avLst/>
+          </a:prstGeom>
+          <a:noFill/>
+        </p:spPr>
+        <p:txBody>
+          <a:bodyPr wrap="square" rtlCol="0">
+            <a:spAutoFit/>
+          </a:bodyPr>
+          <a:lstStyle/>
+          <a:p>
+            <a:r>
+              <a:rPr lang="en-US" dirty="0"/>
+              <a:t>Active element (“</a:t>
+            </a:r>
+            <a:r>
+              <a:rPr lang="en-US" i="1" dirty="0">
+                <a:solidFill>
+                  <a:schemeClr val="accent2"/>
+                </a:solidFill>
+              </a:rPr>
+              <a:t>actors</a:t>
+            </a:r>
+            <a:r>
+              <a:rPr lang="en-US" dirty="0"/>
+              <a:t>”)</a:t>
+            </a:r>
+          </a:p>
+        </p:txBody>
+      </p:sp>
+      <p:cxnSp>
+        <p:nvCxnSpPr>
+          <p:cNvPr id="17" name="Gerade Verbindung mit Pfeil 16">
+            <a:extLst>
+              <a:ext uri="{FF2B5EF4-FFF2-40B4-BE49-F238E27FC236}">
+                <a16:creationId xmlns:a16="http://schemas.microsoft.com/office/drawing/2014/main" id="{C8BBA4AA-C63E-4E58-B58E-97F23B054AB4}"/>
+              </a:ext>
+            </a:extLst>
+          </p:cNvPr>
+          <p:cNvCxnSpPr>
+            <a:stCxn id="14" idx="2"/>
+            <a:endCxn id="15" idx="0"/>
+          </p:cNvCxnSpPr>
+          <p:nvPr/>
+        </p:nvCxnSpPr>
+        <p:spPr>
+          <a:xfrm>
+            <a:off x="4039084" y="5020749"/>
+            <a:ext cx="577797" cy="863367"/>
+          </a:xfrm>
+          <a:prstGeom prst="straightConnector1">
+            <a:avLst/>
+          </a:prstGeom>
+          <a:ln>
+            <a:tailEnd type="triangle"/>
+          </a:ln>
+        </p:spPr>
+        <p:style>
+          <a:lnRef idx="1">
+            <a:schemeClr val="accent1"/>
+          </a:lnRef>
+          <a:fillRef idx="0">
+            <a:schemeClr val="accent1"/>
+          </a:fillRef>
+          <a:effectRef idx="0">
+            <a:schemeClr val="accent1"/>
+          </a:effectRef>
+          <a:fontRef idx="minor">
+            <a:schemeClr val="tx1"/>
+          </a:fontRef>
+        </p:style>
+      </p:cxnSp>
+      <p:sp>
+        <p:nvSpPr>
+          <p:cNvPr id="16" name="Textfeld 15">
+            <a:extLst>
+              <a:ext uri="{FF2B5EF4-FFF2-40B4-BE49-F238E27FC236}">
+                <a16:creationId xmlns:a16="http://schemas.microsoft.com/office/drawing/2014/main" id="{D4207821-594C-4575-9053-B22879101CAA}"/>
+              </a:ext>
+            </a:extLst>
+          </p:cNvPr>
+          <p:cNvSpPr txBox="1"/>
+          <p:nvPr/>
+        </p:nvSpPr>
+        <p:spPr>
+          <a:xfrm>
+            <a:off x="5418292" y="6291852"/>
+            <a:ext cx="2425982" cy="369332"/>
+          </a:xfrm>
+          <a:prstGeom prst="rect">
+            <a:avLst/>
+          </a:prstGeom>
+          <a:noFill/>
+        </p:spPr>
+        <p:txBody>
+          <a:bodyPr wrap="square" rtlCol="0">
+            <a:spAutoFit/>
+          </a:bodyPr>
+          <a:lstStyle/>
+          <a:p>
+            <a:r>
+              <a:rPr lang="en-US" dirty="0"/>
+              <a:t>Active side of the map</a:t>
+            </a:r>
+          </a:p>
+        </p:txBody>
+      </p:sp>
+      <p:sp>
+        <p:nvSpPr>
+          <p:cNvPr id="18" name="Textfeld 17">
+            <a:extLst>
+              <a:ext uri="{FF2B5EF4-FFF2-40B4-BE49-F238E27FC236}">
+                <a16:creationId xmlns:a16="http://schemas.microsoft.com/office/drawing/2014/main" id="{1167758E-FC04-4A3E-AD9F-A7FCBE99EF06}"/>
+              </a:ext>
+            </a:extLst>
+          </p:cNvPr>
+          <p:cNvSpPr txBox="1"/>
+          <p:nvPr/>
+        </p:nvSpPr>
+        <p:spPr>
+          <a:xfrm>
+            <a:off x="8322839" y="6107186"/>
+            <a:ext cx="2690071" cy="646331"/>
+          </a:xfrm>
+          <a:prstGeom prst="rect">
+            <a:avLst/>
+          </a:prstGeom>
+          <a:noFill/>
+        </p:spPr>
+        <p:txBody>
+          <a:bodyPr wrap="square" rtlCol="0">
+            <a:spAutoFit/>
+          </a:bodyPr>
+          <a:lstStyle/>
+          <a:p>
+            <a:r>
+              <a:rPr lang="en-US" dirty="0"/>
+              <a:t>Enemy side of the map (usually hidden)</a:t>
+            </a:r>
+          </a:p>
+        </p:txBody>
+      </p:sp>
+      <p:cxnSp>
+        <p:nvCxnSpPr>
+          <p:cNvPr id="19" name="Gerade Verbindung mit Pfeil 18">
+            <a:extLst>
+              <a:ext uri="{FF2B5EF4-FFF2-40B4-BE49-F238E27FC236}">
+                <a16:creationId xmlns:a16="http://schemas.microsoft.com/office/drawing/2014/main" id="{E4F79937-067F-4541-8FA3-CFFF52CDE2D4}"/>
+              </a:ext>
+            </a:extLst>
+          </p:cNvPr>
+          <p:cNvCxnSpPr>
+            <a:cxnSpLocks/>
+            <a:endCxn id="16" idx="0"/>
+          </p:cNvCxnSpPr>
+          <p:nvPr/>
+        </p:nvCxnSpPr>
+        <p:spPr>
+          <a:xfrm>
+            <a:off x="5035960" y="5478011"/>
+            <a:ext cx="1595323" cy="813841"/>
+          </a:xfrm>
+          <a:prstGeom prst="straightConnector1">
+            <a:avLst/>
+          </a:prstGeom>
+          <a:ln>
+            <a:tailEnd type="triangle"/>
+          </a:ln>
+        </p:spPr>
+        <p:style>
+          <a:lnRef idx="1">
+            <a:schemeClr val="accent1"/>
+          </a:lnRef>
+          <a:fillRef idx="0">
+            <a:schemeClr val="accent1"/>
+          </a:fillRef>
+          <a:effectRef idx="0">
+            <a:schemeClr val="accent1"/>
+          </a:effectRef>
+          <a:fontRef idx="minor">
+            <a:schemeClr val="tx1"/>
+          </a:fontRef>
+        </p:style>
+      </p:cxnSp>
+      <p:cxnSp>
+        <p:nvCxnSpPr>
+          <p:cNvPr id="20" name="Gerade Verbindung mit Pfeil 19">
+            <a:extLst>
+              <a:ext uri="{FF2B5EF4-FFF2-40B4-BE49-F238E27FC236}">
+                <a16:creationId xmlns:a16="http://schemas.microsoft.com/office/drawing/2014/main" id="{A68B49CA-5804-418E-AD52-31B44EF376EA}"/>
+              </a:ext>
+            </a:extLst>
+          </p:cNvPr>
+          <p:cNvCxnSpPr>
+            <a:cxnSpLocks/>
+            <a:endCxn id="18" idx="0"/>
+          </p:cNvCxnSpPr>
+          <p:nvPr/>
+        </p:nvCxnSpPr>
+        <p:spPr>
+          <a:xfrm>
+            <a:off x="8734425" y="5400675"/>
+            <a:ext cx="933450" cy="706511"/>
+          </a:xfrm>
+          <a:prstGeom prst="straightConnector1">
+            <a:avLst/>
+          </a:prstGeom>
+          <a:ln>
+            <a:tailEnd type="triangle"/>
+          </a:ln>
+        </p:spPr>
+        <p:style>
+          <a:lnRef idx="1">
+            <a:schemeClr val="accent1"/>
+          </a:lnRef>
+          <a:fillRef idx="0">
+            <a:schemeClr val="accent1"/>
+          </a:fillRef>
+          <a:effectRef idx="0">
+            <a:schemeClr val="accent1"/>
+          </a:effectRef>
+          <a:fontRef idx="minor">
+            <a:schemeClr val="tx1"/>
+          </a:fontRef>
+        </p:style>
+      </p:cxnSp>
+    </p:spTree>
+    <p:extLst>
+      <p:ext uri="{BB962C8B-B14F-4D97-AF65-F5344CB8AC3E}">
+        <p14:creationId xmlns:p14="http://schemas.microsoft.com/office/powerpoint/2010/main" val="1034573549"/>
+      </p:ext>
+    </p:extLst>
+  </p:cSld>
+  <p:clrMapOvr>
+    <a:masterClrMapping/>
+  </p:clrMapOvr>
+</p:sld>
+</file>
+
+<file path=ppt/slides/slide5.xml><?xml version="1.0" encoding="utf-8"?>
+<p:sld xmlns:a="http://schemas.openxmlformats.org/drawingml/2006/main" xmlns:r="http://schemas.openxmlformats.org/officeDocument/2006/relationships" xmlns:p="http://schemas.openxmlformats.org/presentationml/2006/main">
+  <p:cSld>
+    <p:spTree>
+      <p:nvGrpSpPr>
+        <p:cNvPr id="1" name=""/>
+        <p:cNvGrpSpPr/>
+        <p:nvPr/>
+      </p:nvGrpSpPr>
+      <p:grpSpPr>
+        <a:xfrm>
+          <a:off x="0" y="0"/>
+          <a:ext cx="0" cy="0"/>
+          <a:chOff x="0" y="0"/>
+          <a:chExt cx="0" cy="0"/>
+        </a:xfrm>
+      </p:grpSpPr>
+      <p:sp>
+        <p:nvSpPr>
+          <p:cNvPr id="2" name="Titel 1">
+            <a:extLst>
+              <a:ext uri="{FF2B5EF4-FFF2-40B4-BE49-F238E27FC236}">
+                <a16:creationId xmlns:a16="http://schemas.microsoft.com/office/drawing/2014/main" id="{223780BF-E12E-4750-AC6F-003FA8740E76}"/>
+              </a:ext>
+            </a:extLst>
+          </p:cNvPr>
+          <p:cNvSpPr>
+            <a:spLocks noGrp="1"/>
+          </p:cNvSpPr>
+          <p:nvPr>
+            <p:ph type="title"/>
+          </p:nvPr>
+        </p:nvSpPr>
+        <p:spPr/>
+        <p:txBody>
+          <a:bodyPr/>
+          <a:lstStyle/>
+          <a:p>
+            <a:r>
+              <a:rPr lang="en-US" dirty="0"/>
+              <a:t>Map tile</a:t>
+            </a:r>
+          </a:p>
+        </p:txBody>
+      </p:sp>
+      <p:sp>
+        <p:nvSpPr>
+          <p:cNvPr id="3" name="Textfeld 2">
+            <a:extLst>
+              <a:ext uri="{FF2B5EF4-FFF2-40B4-BE49-F238E27FC236}">
+                <a16:creationId xmlns:a16="http://schemas.microsoft.com/office/drawing/2014/main" id="{6DCDB52F-6AEA-4604-8C97-B6A751357E8F}"/>
+              </a:ext>
+            </a:extLst>
+          </p:cNvPr>
+          <p:cNvSpPr txBox="1"/>
+          <p:nvPr/>
+        </p:nvSpPr>
+        <p:spPr>
+          <a:xfrm>
+            <a:off x="483765" y="1377709"/>
+            <a:ext cx="5078835" cy="369332"/>
+          </a:xfrm>
+          <a:prstGeom prst="rect">
+            <a:avLst/>
+          </a:prstGeom>
+          <a:noFill/>
+        </p:spPr>
+        <p:txBody>
+          <a:bodyPr wrap="square" rtlCol="0">
+            <a:spAutoFit/>
+          </a:bodyPr>
+          <a:lstStyle/>
+          <a:p>
+            <a:r>
+              <a:rPr lang="en-US" dirty="0"/>
+              <a:t>The map tile has a size (in Blender) of 1x1 as square.  </a:t>
+            </a:r>
+          </a:p>
+        </p:txBody>
+      </p:sp>
+      <p:pic>
+        <p:nvPicPr>
+          <p:cNvPr id="5" name="Grafik 4">
+            <a:extLst>
+              <a:ext uri="{FF2B5EF4-FFF2-40B4-BE49-F238E27FC236}">
+                <a16:creationId xmlns:a16="http://schemas.microsoft.com/office/drawing/2014/main" id="{58A97267-04BE-4396-ABCC-3B8E965255CF}"/>
+              </a:ext>
+            </a:extLst>
+          </p:cNvPr>
+          <p:cNvPicPr>
+            <a:picLocks noChangeAspect="1"/>
+          </p:cNvPicPr>
+          <p:nvPr/>
+        </p:nvPicPr>
+        <p:blipFill>
+          <a:blip r:embed="rId2"/>
+          <a:stretch>
+            <a:fillRect/>
+          </a:stretch>
+        </p:blipFill>
+        <p:spPr>
+          <a:xfrm>
+            <a:off x="679268" y="1977245"/>
+            <a:ext cx="4800056" cy="3133715"/>
+          </a:xfrm>
+          <a:prstGeom prst="rect">
+            <a:avLst/>
+          </a:prstGeom>
+        </p:spPr>
+      </p:pic>
+      <p:cxnSp>
+        <p:nvCxnSpPr>
+          <p:cNvPr id="10" name="Gerade Verbindung mit Pfeil 9">
+            <a:extLst>
+              <a:ext uri="{FF2B5EF4-FFF2-40B4-BE49-F238E27FC236}">
+                <a16:creationId xmlns:a16="http://schemas.microsoft.com/office/drawing/2014/main" id="{E288CD49-BCDA-459B-B75A-52E0C631AC9E}"/>
+              </a:ext>
+            </a:extLst>
+          </p:cNvPr>
+          <p:cNvCxnSpPr>
+            <a:cxnSpLocks/>
+            <a:endCxn id="12" idx="0"/>
+          </p:cNvCxnSpPr>
+          <p:nvPr/>
+        </p:nvCxnSpPr>
+        <p:spPr>
+          <a:xfrm flipH="1">
+            <a:off x="2878999" y="3840480"/>
+            <a:ext cx="369298" cy="1920631"/>
+          </a:xfrm>
+          <a:prstGeom prst="straightConnector1">
+            <a:avLst/>
+          </a:prstGeom>
+          <a:ln>
+            <a:tailEnd type="triangle"/>
+          </a:ln>
+        </p:spPr>
+        <p:style>
+          <a:lnRef idx="1">
+            <a:schemeClr val="accent1"/>
+          </a:lnRef>
+          <a:fillRef idx="0">
+            <a:schemeClr val="accent1"/>
+          </a:fillRef>
+          <a:effectRef idx="0">
+            <a:schemeClr val="accent1"/>
+          </a:effectRef>
+          <a:fontRef idx="minor">
+            <a:schemeClr val="tx1"/>
+          </a:fontRef>
+        </p:style>
+      </p:cxnSp>
+      <p:sp>
+        <p:nvSpPr>
+          <p:cNvPr id="12" name="Rechteck 11">
+            <a:extLst>
+              <a:ext uri="{FF2B5EF4-FFF2-40B4-BE49-F238E27FC236}">
+                <a16:creationId xmlns:a16="http://schemas.microsoft.com/office/drawing/2014/main" id="{ADC977AF-C8CA-4A58-AA57-92DA254A00F4}"/>
+              </a:ext>
+            </a:extLst>
+          </p:cNvPr>
+          <p:cNvSpPr/>
+          <p:nvPr/>
+        </p:nvSpPr>
+        <p:spPr>
+          <a:xfrm>
+            <a:off x="2123023" y="5761111"/>
+            <a:ext cx="1511952" cy="369332"/>
+          </a:xfrm>
+          <a:prstGeom prst="rect">
+            <a:avLst/>
+          </a:prstGeom>
+        </p:spPr>
+        <p:txBody>
+          <a:bodyPr wrap="none">
+            <a:spAutoFit/>
+          </a:bodyPr>
+          <a:lstStyle/>
+          <a:p>
+            <a:r>
+              <a:rPr lang="en-US" dirty="0"/>
+              <a:t>A 1x1 map tile</a:t>
+            </a:r>
+          </a:p>
+        </p:txBody>
+      </p:sp>
+    </p:spTree>
+    <p:extLst>
+      <p:ext uri="{BB962C8B-B14F-4D97-AF65-F5344CB8AC3E}">
+        <p14:creationId xmlns:p14="http://schemas.microsoft.com/office/powerpoint/2010/main" val="1585984009"/>
+      </p:ext>
+    </p:extLst>
+  </p:cSld>
+  <p:clrMapOvr>
+    <a:masterClrMapping/>
+  </p:clrMapOvr>
+</p:sld>
+</file>
+
+<file path=ppt/slides/slide6.xml><?xml version="1.0" encoding="utf-8"?>
+<p:sld xmlns:a="http://schemas.openxmlformats.org/drawingml/2006/main" xmlns:r="http://schemas.openxmlformats.org/officeDocument/2006/relationships" xmlns:p="http://schemas.openxmlformats.org/presentationml/2006/main">
+  <p:cSld>
+    <p:spTree>
+      <p:nvGrpSpPr>
+        <p:cNvPr id="1" name=""/>
+        <p:cNvGrpSpPr/>
+        <p:nvPr/>
+      </p:nvGrpSpPr>
+      <p:grpSpPr>
+        <a:xfrm>
+          <a:off x="0" y="0"/>
+          <a:ext cx="0" cy="0"/>
+          <a:chOff x="0" y="0"/>
+          <a:chExt cx="0" cy="0"/>
+        </a:xfrm>
+      </p:grpSpPr>
+      <p:sp>
+        <p:nvSpPr>
+          <p:cNvPr id="2" name="Titel 1">
+            <a:extLst>
+              <a:ext uri="{FF2B5EF4-FFF2-40B4-BE49-F238E27FC236}">
+                <a16:creationId xmlns:a16="http://schemas.microsoft.com/office/drawing/2014/main" id="{223780BF-E12E-4750-AC6F-003FA8740E76}"/>
+              </a:ext>
+            </a:extLst>
+          </p:cNvPr>
+          <p:cNvSpPr>
+            <a:spLocks noGrp="1"/>
+          </p:cNvSpPr>
+          <p:nvPr>
+            <p:ph type="title"/>
+          </p:nvPr>
+        </p:nvSpPr>
+        <p:spPr/>
+        <p:txBody>
+          <a:bodyPr/>
+          <a:lstStyle/>
+          <a:p>
+            <a:r>
+              <a:rPr lang="en-US" dirty="0"/>
+              <a:t>Map tile: type of tiles</a:t>
+            </a:r>
+          </a:p>
+        </p:txBody>
+      </p:sp>
+      <p:sp>
+        <p:nvSpPr>
+          <p:cNvPr id="3" name="Textfeld 2">
+            <a:extLst>
+              <a:ext uri="{FF2B5EF4-FFF2-40B4-BE49-F238E27FC236}">
+                <a16:creationId xmlns:a16="http://schemas.microsoft.com/office/drawing/2014/main" id="{6DCDB52F-6AEA-4604-8C97-B6A751357E8F}"/>
+              </a:ext>
+            </a:extLst>
+          </p:cNvPr>
+          <p:cNvSpPr txBox="1"/>
+          <p:nvPr/>
+        </p:nvSpPr>
+        <p:spPr>
+          <a:xfrm>
+            <a:off x="483765" y="1377709"/>
+            <a:ext cx="6091176" cy="1200329"/>
+          </a:xfrm>
+          <a:prstGeom prst="rect">
+            <a:avLst/>
+          </a:prstGeom>
+          <a:noFill/>
+        </p:spPr>
+        <p:txBody>
+          <a:bodyPr wrap="square" rtlCol="0">
+            <a:spAutoFit/>
+          </a:bodyPr>
+          <a:lstStyle/>
+          <a:p>
+            <a:r>
+              <a:rPr lang="en-US" dirty="0"/>
+              <a:t>The following type of tiles are defined:</a:t>
+            </a:r>
+          </a:p>
+          <a:p>
+            <a:pPr marL="342900" indent="-342900">
+              <a:buAutoNum type="arabicPeriod"/>
+            </a:pPr>
+            <a:r>
+              <a:rPr lang="en-US" dirty="0"/>
+              <a:t>Rocky tile</a:t>
+            </a:r>
+          </a:p>
+          <a:p>
+            <a:pPr marL="342900" indent="-342900">
+              <a:buAutoNum type="arabicPeriod"/>
+            </a:pPr>
+            <a:r>
+              <a:rPr lang="en-US" dirty="0"/>
+              <a:t>Grass tile</a:t>
+            </a:r>
+          </a:p>
+          <a:p>
+            <a:pPr marL="342900" indent="-342900">
+              <a:buAutoNum type="arabicPeriod"/>
+            </a:pPr>
+            <a:endParaRPr lang="en-US" dirty="0"/>
+          </a:p>
+        </p:txBody>
+      </p:sp>
+      <p:pic>
+        <p:nvPicPr>
+          <p:cNvPr id="4" name="Grafik 3">
+            <a:extLst>
+              <a:ext uri="{FF2B5EF4-FFF2-40B4-BE49-F238E27FC236}">
+                <a16:creationId xmlns:a16="http://schemas.microsoft.com/office/drawing/2014/main" id="{6943921D-4247-4D71-B647-A3C6272636A6}"/>
+              </a:ext>
+            </a:extLst>
+          </p:cNvPr>
+          <p:cNvPicPr>
+            <a:picLocks noChangeAspect="1"/>
+          </p:cNvPicPr>
+          <p:nvPr/>
+        </p:nvPicPr>
+        <p:blipFill>
+          <a:blip r:embed="rId2"/>
+          <a:stretch>
+            <a:fillRect/>
+          </a:stretch>
+        </p:blipFill>
+        <p:spPr>
+          <a:xfrm>
+            <a:off x="8029300" y="1765659"/>
+            <a:ext cx="5" cy="8"/>
+          </a:xfrm>
+          <a:prstGeom prst="rect">
+            <a:avLst/>
+          </a:prstGeom>
+        </p:spPr>
+      </p:pic>
+      <p:pic>
+        <p:nvPicPr>
+          <p:cNvPr id="6" name="Grafik 5">
+            <a:extLst>
+              <a:ext uri="{FF2B5EF4-FFF2-40B4-BE49-F238E27FC236}">
+                <a16:creationId xmlns:a16="http://schemas.microsoft.com/office/drawing/2014/main" id="{3A655A43-B5E7-47C7-9346-9BA5B28675FA}"/>
+              </a:ext>
+            </a:extLst>
+          </p:cNvPr>
+          <p:cNvPicPr>
+            <a:picLocks noChangeAspect="1"/>
+          </p:cNvPicPr>
+          <p:nvPr/>
+        </p:nvPicPr>
+        <p:blipFill rotWithShape="1">
+          <a:blip r:embed="rId3"/>
+          <a:srcRect t="29055"/>
+          <a:stretch/>
+        </p:blipFill>
+        <p:spPr>
+          <a:xfrm>
+            <a:off x="6884879" y="2002247"/>
+            <a:ext cx="916297" cy="793204"/>
+          </a:xfrm>
+          <a:prstGeom prst="rect">
+            <a:avLst/>
+          </a:prstGeom>
+        </p:spPr>
+      </p:pic>
+      <p:cxnSp>
+        <p:nvCxnSpPr>
+          <p:cNvPr id="8" name="Gerade Verbindung mit Pfeil 7">
+            <a:extLst>
+              <a:ext uri="{FF2B5EF4-FFF2-40B4-BE49-F238E27FC236}">
+                <a16:creationId xmlns:a16="http://schemas.microsoft.com/office/drawing/2014/main" id="{9075F3FD-22E3-43D8-8F34-2EDBCA35FB06}"/>
+              </a:ext>
+            </a:extLst>
+          </p:cNvPr>
+          <p:cNvCxnSpPr>
+            <a:cxnSpLocks/>
+            <a:endCxn id="6" idx="1"/>
+          </p:cNvCxnSpPr>
+          <p:nvPr/>
+        </p:nvCxnSpPr>
+        <p:spPr>
+          <a:xfrm>
+            <a:off x="1907177" y="2142309"/>
+            <a:ext cx="4977702" cy="256540"/>
+          </a:xfrm>
+          <a:prstGeom prst="straightConnector1">
+            <a:avLst/>
+          </a:prstGeom>
+          <a:ln>
+            <a:tailEnd type="triangle"/>
+          </a:ln>
+        </p:spPr>
+        <p:style>
+          <a:lnRef idx="1">
+            <a:schemeClr val="accent1"/>
+          </a:lnRef>
+          <a:fillRef idx="0">
+            <a:schemeClr val="accent1"/>
+          </a:fillRef>
+          <a:effectRef idx="0">
+            <a:schemeClr val="accent1"/>
+          </a:effectRef>
+          <a:fontRef idx="minor">
+            <a:schemeClr val="tx1"/>
+          </a:fontRef>
+        </p:style>
+      </p:cxnSp>
+      <p:pic>
+        <p:nvPicPr>
+          <p:cNvPr id="16" name="Grafik 15">
+            <a:extLst>
+              <a:ext uri="{FF2B5EF4-FFF2-40B4-BE49-F238E27FC236}">
+                <a16:creationId xmlns:a16="http://schemas.microsoft.com/office/drawing/2014/main" id="{937FF031-6932-48A3-8FE4-86817DEEA172}"/>
+              </a:ext>
+            </a:extLst>
+          </p:cNvPr>
+          <p:cNvPicPr>
+            <a:picLocks noChangeAspect="1"/>
+          </p:cNvPicPr>
+          <p:nvPr/>
+        </p:nvPicPr>
+        <p:blipFill>
+          <a:blip r:embed="rId4"/>
+          <a:stretch>
+            <a:fillRect/>
+          </a:stretch>
+        </p:blipFill>
+        <p:spPr>
+          <a:xfrm>
+            <a:off x="6884880" y="1092212"/>
+            <a:ext cx="848320" cy="840003"/>
+          </a:xfrm>
+          <a:prstGeom prst="rect">
+            <a:avLst/>
+          </a:prstGeom>
+        </p:spPr>
+      </p:pic>
+      <p:cxnSp>
+        <p:nvCxnSpPr>
+          <p:cNvPr id="18" name="Gerade Verbindung mit Pfeil 17">
+            <a:extLst>
+              <a:ext uri="{FF2B5EF4-FFF2-40B4-BE49-F238E27FC236}">
+                <a16:creationId xmlns:a16="http://schemas.microsoft.com/office/drawing/2014/main" id="{B3E133B2-756A-4081-897D-14905131FE29}"/>
+              </a:ext>
+            </a:extLst>
+          </p:cNvPr>
+          <p:cNvCxnSpPr>
+            <a:endCxn id="16" idx="1"/>
+          </p:cNvCxnSpPr>
+          <p:nvPr/>
+        </p:nvCxnSpPr>
+        <p:spPr>
+          <a:xfrm flipV="1">
+            <a:off x="1907177" y="1512214"/>
+            <a:ext cx="4977703" cy="334003"/>
+          </a:xfrm>
+          <a:prstGeom prst="straightConnector1">
+            <a:avLst/>
+          </a:prstGeom>
+          <a:ln>
+            <a:tailEnd type="triangle"/>
+          </a:ln>
+        </p:spPr>
+        <p:style>
+          <a:lnRef idx="1">
+            <a:schemeClr val="accent1"/>
+          </a:lnRef>
+          <a:fillRef idx="0">
+            <a:schemeClr val="accent1"/>
+          </a:fillRef>
+          <a:effectRef idx="0">
+            <a:schemeClr val="accent1"/>
+          </a:effectRef>
+          <a:fontRef idx="minor">
+            <a:schemeClr val="tx1"/>
+          </a:fontRef>
+        </p:style>
+      </p:cxnSp>
+    </p:spTree>
+    <p:extLst>
+      <p:ext uri="{BB962C8B-B14F-4D97-AF65-F5344CB8AC3E}">
+        <p14:creationId xmlns:p14="http://schemas.microsoft.com/office/powerpoint/2010/main" val="1574252462"/>
+      </p:ext>
+    </p:extLst>
+  </p:cSld>
+  <p:clrMapOvr>
+    <a:masterClrMapping/>
+  </p:clrMapOvr>
+</p:sld>
+</file>
+
+<file path=ppt/slides/slide7.xml><?xml version="1.0" encoding="utf-8"?>
+<p:sld xmlns:a="http://schemas.openxmlformats.org/drawingml/2006/main" xmlns:r="http://schemas.openxmlformats.org/officeDocument/2006/relationships" xmlns:p="http://schemas.openxmlformats.org/presentationml/2006/main">
+  <p:cSld>
+    <p:spTree>
+      <p:nvGrpSpPr>
+        <p:cNvPr id="1" name=""/>
+        <p:cNvGrpSpPr/>
+        <p:nvPr/>
+      </p:nvGrpSpPr>
+      <p:grpSpPr>
+        <a:xfrm>
+          <a:off x="0" y="0"/>
+          <a:ext cx="0" cy="0"/>
+          <a:chOff x="0" y="0"/>
+          <a:chExt cx="0" cy="0"/>
+        </a:xfrm>
+      </p:grpSpPr>
+      <p:sp>
+        <p:nvSpPr>
+          <p:cNvPr id="2" name="Titel 1">
+            <a:extLst>
+              <a:ext uri="{FF2B5EF4-FFF2-40B4-BE49-F238E27FC236}">
+                <a16:creationId xmlns:a16="http://schemas.microsoft.com/office/drawing/2014/main" id="{6CF6C096-7FFB-4E59-B1B0-25EBD8AFE167}"/>
+              </a:ext>
+            </a:extLst>
+          </p:cNvPr>
+          <p:cNvSpPr>
+            <a:spLocks noGrp="1"/>
+          </p:cNvSpPr>
+          <p:nvPr>
+            <p:ph type="title"/>
+          </p:nvPr>
+        </p:nvSpPr>
+        <p:spPr/>
+        <p:txBody>
+          <a:bodyPr/>
+          <a:lstStyle/>
+          <a:p>
+            <a:pPr algn="ctr"/>
+            <a:r>
+              <a:rPr lang="en-US" dirty="0"/>
+              <a:t>Game Actors</a:t>
+            </a:r>
+          </a:p>
+        </p:txBody>
+      </p:sp>
+    </p:spTree>
+    <p:extLst>
+      <p:ext uri="{BB962C8B-B14F-4D97-AF65-F5344CB8AC3E}">
+        <p14:creationId xmlns:p14="http://schemas.microsoft.com/office/powerpoint/2010/main" val="4116777535"/>
+      </p:ext>
+    </p:extLst>
+  </p:cSld>
+  <p:clrMapOvr>
+    <a:masterClrMapping/>
+  </p:clrMapOvr>
+</p:sld>
+</file>
+
+<file path=ppt/slides/slide8.xml><?xml version="1.0" encoding="utf-8"?>
+<p:sld xmlns:a="http://schemas.openxmlformats.org/drawingml/2006/main" xmlns:r="http://schemas.openxmlformats.org/officeDocument/2006/relationships" xmlns:p="http://schemas.openxmlformats.org/presentationml/2006/main">
+  <p:cSld>
+    <p:spTree>
+      <p:nvGrpSpPr>
+        <p:cNvPr id="1" name=""/>
+        <p:cNvGrpSpPr/>
+        <p:nvPr/>
+      </p:nvGrpSpPr>
+      <p:grpSpPr>
+        <a:xfrm>
+          <a:off x="0" y="0"/>
+          <a:ext cx="0" cy="0"/>
+          <a:chOff x="0" y="0"/>
+          <a:chExt cx="0" cy="0"/>
+        </a:xfrm>
+      </p:grpSpPr>
+      <p:sp>
+        <p:nvSpPr>
+          <p:cNvPr id="2" name="Titel 1">
+            <a:extLst>
+              <a:ext uri="{FF2B5EF4-FFF2-40B4-BE49-F238E27FC236}">
+                <a16:creationId xmlns:a16="http://schemas.microsoft.com/office/drawing/2014/main" id="{223780BF-E12E-4750-AC6F-003FA8740E76}"/>
+              </a:ext>
+            </a:extLst>
+          </p:cNvPr>
+          <p:cNvSpPr>
+            <a:spLocks noGrp="1"/>
+          </p:cNvSpPr>
+          <p:nvPr>
+            <p:ph type="title"/>
+          </p:nvPr>
+        </p:nvSpPr>
+        <p:spPr/>
+        <p:txBody>
+          <a:bodyPr/>
+          <a:lstStyle/>
+          <a:p>
+            <a:r>
+              <a:rPr lang="en-US" dirty="0"/>
+              <a:t>Game Actors: common properties</a:t>
+            </a:r>
+          </a:p>
+        </p:txBody>
+      </p:sp>
+      <p:sp>
+        <p:nvSpPr>
+          <p:cNvPr id="3" name="Textfeld 2">
+            <a:extLst>
+              <a:ext uri="{FF2B5EF4-FFF2-40B4-BE49-F238E27FC236}">
+                <a16:creationId xmlns:a16="http://schemas.microsoft.com/office/drawing/2014/main" id="{6DCDB52F-6AEA-4604-8C97-B6A751357E8F}"/>
+              </a:ext>
+            </a:extLst>
+          </p:cNvPr>
+          <p:cNvSpPr txBox="1"/>
+          <p:nvPr/>
+        </p:nvSpPr>
+        <p:spPr>
+          <a:xfrm>
+            <a:off x="483764" y="1377709"/>
+            <a:ext cx="10870035" cy="923330"/>
+          </a:xfrm>
+          <a:prstGeom prst="rect">
+            <a:avLst/>
+          </a:prstGeom>
+          <a:noFill/>
+        </p:spPr>
+        <p:txBody>
+          <a:bodyPr wrap="square" rtlCol="0">
+            <a:spAutoFit/>
+          </a:bodyPr>
+          <a:lstStyle/>
+          <a:p>
+            <a:pPr marL="285750" indent="-285750">
+              <a:buFontTx/>
+              <a:buChar char="-"/>
+            </a:pPr>
+            <a:r>
+              <a:rPr lang="en-US" dirty="0"/>
+              <a:t>Each actor, either passive or active one, will have a maximum size of a tile: 1x1.</a:t>
+            </a:r>
+          </a:p>
+          <a:p>
+            <a:pPr marL="285750" indent="-285750">
+              <a:buFontTx/>
+              <a:buChar char="-"/>
+            </a:pPr>
+            <a:endParaRPr lang="en-US" dirty="0"/>
+          </a:p>
+          <a:p>
+            <a:pPr marL="342900" indent="-342900">
+              <a:buAutoNum type="arabicPeriod"/>
+            </a:pPr>
+            <a:endParaRPr lang="en-US" dirty="0"/>
+          </a:p>
+        </p:txBody>
+      </p:sp>
+      <p:pic>
+        <p:nvPicPr>
+          <p:cNvPr id="4" name="Grafik 3">
+            <a:extLst>
+              <a:ext uri="{FF2B5EF4-FFF2-40B4-BE49-F238E27FC236}">
+                <a16:creationId xmlns:a16="http://schemas.microsoft.com/office/drawing/2014/main" id="{6943921D-4247-4D71-B647-A3C6272636A6}"/>
+              </a:ext>
+            </a:extLst>
+          </p:cNvPr>
+          <p:cNvPicPr>
+            <a:picLocks noChangeAspect="1"/>
+          </p:cNvPicPr>
+          <p:nvPr/>
+        </p:nvPicPr>
+        <p:blipFill>
+          <a:blip r:embed="rId2"/>
+          <a:stretch>
+            <a:fillRect/>
+          </a:stretch>
+        </p:blipFill>
+        <p:spPr>
+          <a:xfrm>
+            <a:off x="8029300" y="1765659"/>
+            <a:ext cx="5" cy="8"/>
+          </a:xfrm>
+          <a:prstGeom prst="rect">
+            <a:avLst/>
+          </a:prstGeom>
+        </p:spPr>
+      </p:pic>
+    </p:spTree>
+    <p:extLst>
+      <p:ext uri="{BB962C8B-B14F-4D97-AF65-F5344CB8AC3E}">
+        <p14:creationId xmlns:p14="http://schemas.microsoft.com/office/powerpoint/2010/main" val="188138585"/>
+      </p:ext>
+    </p:extLst>
+  </p:cSld>
+  <p:clrMapOvr>
+    <a:masterClrMapping/>
+  </p:clrMapOvr>
+</p:sld>
+</file>
+
+<file path=ppt/slides/slide9.xml><?xml version="1.0" encoding="utf-8"?>
+<p:sld xmlns:a="http://schemas.openxmlformats.org/drawingml/2006/main" xmlns:r="http://schemas.openxmlformats.org/officeDocument/2006/relationships" xmlns:p="http://schemas.openxmlformats.org/presentationml/2006/main">
+  <p:cSld>
+    <p:spTree>
+      <p:nvGrpSpPr>
+        <p:cNvPr id="1" name=""/>
+        <p:cNvGrpSpPr/>
+        <p:nvPr/>
+      </p:nvGrpSpPr>
+      <p:grpSpPr>
+        <a:xfrm>
+          <a:off x="0" y="0"/>
+          <a:ext cx="0" cy="0"/>
+          <a:chOff x="0" y="0"/>
+          <a:chExt cx="0" cy="0"/>
+        </a:xfrm>
+      </p:grpSpPr>
+      <p:sp>
+        <p:nvSpPr>
+          <p:cNvPr id="2" name="Titel 1">
+            <a:extLst>
+              <a:ext uri="{FF2B5EF4-FFF2-40B4-BE49-F238E27FC236}">
+                <a16:creationId xmlns:a16="http://schemas.microsoft.com/office/drawing/2014/main" id="{223780BF-E12E-4750-AC6F-003FA8740E76}"/>
+              </a:ext>
+            </a:extLst>
+          </p:cNvPr>
+          <p:cNvSpPr>
+            <a:spLocks noGrp="1"/>
+          </p:cNvSpPr>
+          <p:nvPr>
+            <p:ph type="title"/>
+          </p:nvPr>
+        </p:nvSpPr>
+        <p:spPr/>
+        <p:txBody>
+          <a:bodyPr/>
+          <a:lstStyle/>
+          <a:p>
+            <a:r>
+              <a:rPr lang="en-US" dirty="0"/>
+              <a:t>Game Actors: passive actors</a:t>
+            </a:r>
+          </a:p>
+        </p:txBody>
+      </p:sp>
+      <p:sp>
+        <p:nvSpPr>
+          <p:cNvPr id="3" name="Textfeld 2">
+            <a:extLst>
+              <a:ext uri="{FF2B5EF4-FFF2-40B4-BE49-F238E27FC236}">
+                <a16:creationId xmlns:a16="http://schemas.microsoft.com/office/drawing/2014/main" id="{6DCDB52F-6AEA-4604-8C97-B6A751357E8F}"/>
+              </a:ext>
+            </a:extLst>
+          </p:cNvPr>
+          <p:cNvSpPr txBox="1"/>
+          <p:nvPr/>
+        </p:nvSpPr>
+        <p:spPr>
+          <a:xfrm>
+            <a:off x="483765" y="1377709"/>
+            <a:ext cx="6091176" cy="646331"/>
+          </a:xfrm>
+          <a:prstGeom prst="rect">
+            <a:avLst/>
+          </a:prstGeom>
+          <a:noFill/>
+        </p:spPr>
+        <p:txBody>
+          <a:bodyPr wrap="square" rtlCol="0">
+            <a:spAutoFit/>
+          </a:bodyPr>
+          <a:lstStyle/>
+          <a:p>
+            <a:r>
+              <a:rPr lang="en-US" dirty="0"/>
+              <a:t>…</a:t>
+            </a:r>
+          </a:p>
+          <a:p>
+            <a:pPr marL="342900" indent="-342900">
+              <a:buAutoNum type="arabicPeriod"/>
+            </a:pPr>
+            <a:endParaRPr lang="en-US" dirty="0"/>
+          </a:p>
+        </p:txBody>
+      </p:sp>
+      <p:pic>
+        <p:nvPicPr>
+          <p:cNvPr id="4" name="Grafik 3">
+            <a:extLst>
+              <a:ext uri="{FF2B5EF4-FFF2-40B4-BE49-F238E27FC236}">
+                <a16:creationId xmlns:a16="http://schemas.microsoft.com/office/drawing/2014/main" id="{6943921D-4247-4D71-B647-A3C6272636A6}"/>
+              </a:ext>
+            </a:extLst>
+          </p:cNvPr>
+          <p:cNvPicPr>
+            <a:picLocks noChangeAspect="1"/>
+          </p:cNvPicPr>
+          <p:nvPr/>
+        </p:nvPicPr>
+        <p:blipFill>
+          <a:blip r:embed="rId2"/>
+          <a:stretch>
+            <a:fillRect/>
+          </a:stretch>
+        </p:blipFill>
+        <p:spPr>
+          <a:xfrm>
+            <a:off x="8029300" y="1765659"/>
+            <a:ext cx="5" cy="8"/>
+          </a:xfrm>
+          <a:prstGeom prst="rect">
+            <a:avLst/>
+          </a:prstGeom>
+        </p:spPr>
+      </p:pic>
+    </p:spTree>
+    <p:extLst>
+      <p:ext uri="{BB962C8B-B14F-4D97-AF65-F5344CB8AC3E}">
+        <p14:creationId xmlns:p14="http://schemas.microsoft.com/office/powerpoint/2010/main" val="1547438955"/>
       </p:ext>
     </p:extLst>
   </p:cSld>
@@ -10821,6 +12428,23 @@
 </file>
 
 <file path=customXml/item1.xml><?xml version="1.0" encoding="utf-8"?>
+<p:properties xmlns:p="http://schemas.microsoft.com/office/2006/metadata/properties" xmlns:xsi="http://www.w3.org/2001/XMLSchema-instance" xmlns:pc="http://schemas.microsoft.com/office/infopath/2007/PartnerControls">
+  <documentManagement>
+    <MediaServiceKeyPoints xmlns="71af3243-3dd4-4a8d-8c0d-dd76da1f02a5" xsi:nil="true"/>
+  </documentManagement>
+</p:properties>
+</file>
+
+<file path=customXml/item2.xml><?xml version="1.0" encoding="utf-8"?>
+<?mso-contentType ?>
+<FormTemplates xmlns="http://schemas.microsoft.com/sharepoint/v3/contenttype/forms">
+  <Display>DocumentLibraryForm</Display>
+  <Edit>DocumentLibraryForm</Edit>
+  <New>DocumentLibraryForm</New>
+</FormTemplates>
+</file>
+
+<file path=customXml/item3.xml><?xml version="1.0" encoding="utf-8"?>
 <ct:contentTypeSchema xmlns:ct="http://schemas.microsoft.com/office/2006/metadata/contentType" xmlns:ma="http://schemas.microsoft.com/office/2006/metadata/properties/metaAttributes" ct:_="" ma:_="" ma:contentTypeName="Document" ma:contentTypeID="0x01010079F111ED35F8CC479449609E8A0923A6" ma:contentTypeVersion="11" ma:contentTypeDescription="Create a new document." ma:contentTypeScope="" ma:versionID="96291512c1ee715ab617f4c07df79fc1">
   <xsd:schema xmlns:xsd="http://www.w3.org/2001/XMLSchema" xmlns:xs="http://www.w3.org/2001/XMLSchema" xmlns:p="http://schemas.microsoft.com/office/2006/metadata/properties" xmlns:ns2="71af3243-3dd4-4a8d-8c0d-dd76da1f02a5" xmlns:ns3="16c05727-aa75-4e4a-9b5f-8a80a1165891" targetNamespace="http://schemas.microsoft.com/office/2006/metadata/properties" ma:root="true" ma:fieldsID="8256c27c40ca5c40ce1cf6c44f0205df" ns2:_="" ns3:_="">
     <xsd:import namespace="71af3243-3dd4-4a8d-8c0d-dd76da1f02a5"/>
@@ -11031,24 +12655,25 @@
 </ct:contentTypeSchema>
 </file>
 
-<file path=customXml/item2.xml><?xml version="1.0" encoding="utf-8"?>
-<p:properties xmlns:p="http://schemas.microsoft.com/office/2006/metadata/properties" xmlns:xsi="http://www.w3.org/2001/XMLSchema-instance" xmlns:pc="http://schemas.microsoft.com/office/infopath/2007/PartnerControls">
-  <documentManagement>
-    <MediaServiceKeyPoints xmlns="71af3243-3dd4-4a8d-8c0d-dd76da1f02a5" xsi:nil="true"/>
-  </documentManagement>
-</p:properties>
+<file path=customXml/itemProps1.xml><?xml version="1.0" encoding="utf-8"?>
+<ds:datastoreItem xmlns:ds="http://schemas.openxmlformats.org/officeDocument/2006/customXml" ds:itemID="{979A33E2-B943-47EB-A0F4-8C84503D162A}">
+  <ds:schemaRefs>
+    <ds:schemaRef ds:uri="http://schemas.microsoft.com/office/2006/metadata/properties"/>
+    <ds:schemaRef ds:uri="http://schemas.microsoft.com/office/infopath/2007/PartnerControls"/>
+    <ds:schemaRef ds:uri="71af3243-3dd4-4a8d-8c0d-dd76da1f02a5"/>
+  </ds:schemaRefs>
+</ds:datastoreItem>
 </file>
 
-<file path=customXml/item3.xml><?xml version="1.0" encoding="utf-8"?>
-<?mso-contentType ?>
-<FormTemplates xmlns="http://schemas.microsoft.com/sharepoint/v3/contenttype/forms">
-  <Display>DocumentLibraryForm</Display>
-  <Edit>DocumentLibraryForm</Edit>
-  <New>DocumentLibraryForm</New>
-</FormTemplates>
+<file path=customXml/itemProps2.xml><?xml version="1.0" encoding="utf-8"?>
+<ds:datastoreItem xmlns:ds="http://schemas.openxmlformats.org/officeDocument/2006/customXml" ds:itemID="{25D76B92-E0A9-498F-A983-7D112F530EAB}">
+  <ds:schemaRefs>
+    <ds:schemaRef ds:uri="http://schemas.microsoft.com/sharepoint/v3/contenttype/forms"/>
+  </ds:schemaRefs>
+</ds:datastoreItem>
 </file>
 
-<file path=customXml/itemProps1.xml><?xml version="1.0" encoding="utf-8"?>
+<file path=customXml/itemProps3.xml><?xml version="1.0" encoding="utf-8"?>
 <ds:datastoreItem xmlns:ds="http://schemas.openxmlformats.org/officeDocument/2006/customXml" ds:itemID="{954BF5EA-3A1C-42A7-8861-03D68A95C932}">
   <ds:schemaRefs>
     <ds:schemaRef ds:uri="http://schemas.microsoft.com/office/2006/metadata/contentType"/>
@@ -11065,22 +12690,4 @@
     <ds:schemaRef ds:uri="http://schemas.microsoft.com/internal/obd"/>
   </ds:schemaRefs>
 </ds:datastoreItem>
-</file>
-
-<file path=customXml/itemProps2.xml><?xml version="1.0" encoding="utf-8"?>
-<ds:datastoreItem xmlns:ds="http://schemas.openxmlformats.org/officeDocument/2006/customXml" ds:itemID="{979A33E2-B943-47EB-A0F4-8C84503D162A}">
-  <ds:schemaRefs>
-    <ds:schemaRef ds:uri="http://schemas.microsoft.com/office/2006/metadata/properties"/>
-    <ds:schemaRef ds:uri="http://schemas.microsoft.com/office/infopath/2007/PartnerControls"/>
-    <ds:schemaRef ds:uri="71af3243-3dd4-4a8d-8c0d-dd76da1f02a5"/>
-  </ds:schemaRefs>
-</ds:datastoreItem>
-</file>
-
-<file path=customXml/itemProps3.xml><?xml version="1.0" encoding="utf-8"?>
-<ds:datastoreItem xmlns:ds="http://schemas.openxmlformats.org/officeDocument/2006/customXml" ds:itemID="{25D76B92-E0A9-498F-A983-7D112F530EAB}">
-  <ds:schemaRefs>
-    <ds:schemaRef ds:uri="http://schemas.microsoft.com/sharepoint/v3/contenttype/forms"/>
-  </ds:schemaRefs>
-</ds:datastoreItem>
 </file>
</xml_diff>

<commit_message>
Upgrade Gradle to last version; Start loading the Map to prepare it for importing the game actors
</commit_message>
<xml_diff>
--- a/PlanesAndShips/docs/ProjectDocumentation.pptx
+++ b/PlanesAndShips/docs/ProjectDocumentation.pptx
@@ -5,10 +5,10 @@
     <p:sldMasterId id="2147483648" r:id="rId4"/>
   </p:sldMasterIdLst>
   <p:notesMasterIdLst>
-    <p:notesMasterId r:id="rId22"/>
+    <p:notesMasterId r:id="rId24"/>
   </p:notesMasterIdLst>
   <p:handoutMasterIdLst>
-    <p:handoutMasterId r:id="rId23"/>
+    <p:handoutMasterId r:id="rId25"/>
   </p:handoutMasterIdLst>
   <p:sldIdLst>
     <p:sldId id="258" r:id="rId5"/>
@@ -23,11 +23,13 @@
     <p:sldId id="270" r:id="rId14"/>
     <p:sldId id="272" r:id="rId15"/>
     <p:sldId id="273" r:id="rId16"/>
-    <p:sldId id="262" r:id="rId17"/>
-    <p:sldId id="260" r:id="rId18"/>
-    <p:sldId id="263" r:id="rId19"/>
-    <p:sldId id="265" r:id="rId20"/>
-    <p:sldId id="257" r:id="rId21"/>
+    <p:sldId id="274" r:id="rId17"/>
+    <p:sldId id="275" r:id="rId18"/>
+    <p:sldId id="262" r:id="rId19"/>
+    <p:sldId id="260" r:id="rId20"/>
+    <p:sldId id="263" r:id="rId21"/>
+    <p:sldId id="265" r:id="rId22"/>
+    <p:sldId id="257" r:id="rId23"/>
   </p:sldIdLst>
   <p:sldSz cx="12192000" cy="6858000"/>
   <p:notesSz cx="6858000" cy="9144000"/>
@@ -5245,7 +5247,7 @@
             <a:pPr rtl="0"/>
             <a:fld id="{E74A1035-8F00-4EEB-B9C9-E943DCEB4BDB}" type="datetime1">
               <a:rPr lang="de-DE" smtClean="0"/>
-              <a:t>20.06.2023</a:t>
+              <a:t>25.06.2023</a:t>
             </a:fld>
             <a:endParaRPr lang="de-DE" dirty="0"/>
           </a:p>
@@ -5427,7 +5429,7 @@
             <a:pPr rtl="0"/>
             <a:fld id="{CA9E6DEB-429B-4B22-B452-0DBD8F042FF5}" type="datetime1">
               <a:rPr lang="de-DE" noProof="0" smtClean="0"/>
-              <a:t>20.06.2023</a:t>
+              <a:t>25.06.2023</a:t>
             </a:fld>
             <a:endParaRPr lang="de-DE" noProof="0" dirty="0"/>
           </a:p>
@@ -5764,7 +5766,7 @@
             <a:pPr rtl="0"/>
             <a:fld id="{57D1EDB5-B54C-40F7-AED3-6FEDBDE3068F}" type="slidenum">
               <a:rPr lang="de-DE" smtClean="0"/>
-              <a:t>17</a:t>
+              <a:t>19</a:t>
             </a:fld>
             <a:endParaRPr lang="de-DE" dirty="0"/>
           </a:p>
@@ -5854,7 +5856,7 @@
             <a:pPr rtl="0"/>
             <a:fld id="{DFA41115-531E-4370-8F5F-63608AE9F763}" type="datetime1">
               <a:rPr lang="de-DE" noProof="0" smtClean="0"/>
-              <a:t>20.06.2023</a:t>
+              <a:t>25.06.2023</a:t>
             </a:fld>
             <a:endParaRPr lang="de-DE" noProof="0" dirty="0"/>
           </a:p>
@@ -6099,7 +6101,7 @@
             <a:pPr rtl="0"/>
             <a:fld id="{EBD7C5AD-4BE3-461F-BD2B-073C92291DC5}" type="datetime1">
               <a:rPr lang="de-DE" noProof="0" smtClean="0"/>
-              <a:t>20.06.2023</a:t>
+              <a:t>25.06.2023</a:t>
             </a:fld>
             <a:endParaRPr lang="de-DE" noProof="0" dirty="0"/>
           </a:p>
@@ -6809,7 +6811,7 @@
         <p:spPr>
           <a:xfrm>
             <a:off x="483764" y="1377709"/>
-            <a:ext cx="7432327" cy="3416320"/>
+            <a:ext cx="7432327" cy="3693319"/>
           </a:xfrm>
           <a:prstGeom prst="rect">
             <a:avLst/>
@@ -6903,13 +6905,8 @@
           <a:p>
             <a:r>
               <a:rPr lang="en-US" dirty="0"/>
-              <a:t>- A tank must have a center of rotation common for all components to make possible to rotate individual components against the same single point of rotation. While using in Blender the “join” feature this must be </a:t>
-            </a:r>
-            <a:r>
-              <a:rPr lang="en-US"/>
-              <a:t>kept in mind.</a:t>
-            </a:r>
-            <a:endParaRPr lang="en-US" dirty="0"/>
+              <a:t>- A tank must have a center of symmetry common for all components to make possible to rotate individual components against the same single point of rotation. While using in Blender the “join” feature this must be kept in mind. See each individual model details.</a:t>
+            </a:r>
           </a:p>
         </p:txBody>
       </p:sp>
@@ -7055,7 +7052,7 @@
         <p:spPr>
           <a:xfrm>
             <a:off x="483764" y="1377709"/>
-            <a:ext cx="7432327" cy="1754326"/>
+            <a:ext cx="7432327" cy="2031325"/>
           </a:xfrm>
           <a:prstGeom prst="rect">
             <a:avLst/>
@@ -7079,8 +7076,12 @@
               <a:buAutoNum type="arabicPeriod"/>
             </a:pPr>
             <a:r>
+              <a:rPr lang="en-US" b="1" u="sng" dirty="0"/>
+              <a:t>Main body </a:t>
+            </a:r>
+            <a:r>
               <a:rPr lang="en-US" dirty="0"/>
-              <a:t>Main body chassis with own material(s) that are fixed during the game</a:t>
+              <a:t>chassis with own material(s) that are fixed during the game</a:t>
             </a:r>
           </a:p>
           <a:p>
@@ -7089,8 +7090,12 @@
               <a:buAutoNum type="arabicPeriod"/>
             </a:pPr>
             <a:r>
+              <a:rPr lang="en-US" b="1" u="sng" dirty="0"/>
+              <a:t>Tracks and/or wheels </a:t>
+            </a:r>
+            <a:r>
               <a:rPr lang="en-US" dirty="0"/>
-              <a:t>Tracks and/or wheels with materials that may change in between to simulate the rotation/movement</a:t>
+              <a:t>with materials that may change in between to simulate the rotation/movement</a:t>
             </a:r>
           </a:p>
           <a:p>
@@ -7099,8 +7104,20 @@
               <a:buAutoNum type="arabicPeriod"/>
             </a:pPr>
             <a:r>
+              <a:rPr lang="en-US" i="1" u="sng" dirty="0"/>
+              <a:t>Lights</a:t>
+            </a:r>
+            <a:r>
               <a:rPr lang="en-US" dirty="0"/>
-              <a:t>Lights with ON/OFF materials </a:t>
+              <a:t> with ON/OFF materials (as part of the </a:t>
+            </a:r>
+            <a:r>
+              <a:rPr lang="en-US" b="1" u="sng" dirty="0"/>
+              <a:t>main body</a:t>
+            </a:r>
+            <a:r>
+              <a:rPr lang="en-US" dirty="0"/>
+              <a:t>!). See next slides for details. </a:t>
             </a:r>
           </a:p>
           <a:p>
@@ -7112,6 +7129,312 @@
           </a:p>
         </p:txBody>
       </p:sp>
+      <p:pic>
+        <p:nvPicPr>
+          <p:cNvPr id="4" name="Grafik 3">
+            <a:extLst>
+              <a:ext uri="{FF2B5EF4-FFF2-40B4-BE49-F238E27FC236}">
+                <a16:creationId xmlns:a16="http://schemas.microsoft.com/office/drawing/2014/main" id="{EECFFDDB-750C-463D-9052-EF680B1D5B91}"/>
+              </a:ext>
+            </a:extLst>
+          </p:cNvPr>
+          <p:cNvPicPr>
+            <a:picLocks noChangeAspect="1"/>
+          </p:cNvPicPr>
+          <p:nvPr/>
+        </p:nvPicPr>
+        <p:blipFill>
+          <a:blip r:embed="rId2"/>
+          <a:stretch>
+            <a:fillRect/>
+          </a:stretch>
+        </p:blipFill>
+        <p:spPr>
+          <a:xfrm>
+            <a:off x="8186057" y="1665266"/>
+            <a:ext cx="3376882" cy="1466769"/>
+          </a:xfrm>
+          <a:prstGeom prst="rect">
+            <a:avLst/>
+          </a:prstGeom>
+        </p:spPr>
+      </p:pic>
+      <p:cxnSp>
+        <p:nvCxnSpPr>
+          <p:cNvPr id="6" name="Gerade Verbindung mit Pfeil 5">
+            <a:extLst>
+              <a:ext uri="{FF2B5EF4-FFF2-40B4-BE49-F238E27FC236}">
+                <a16:creationId xmlns:a16="http://schemas.microsoft.com/office/drawing/2014/main" id="{C0450ACC-A824-45FD-9BEB-49AFD8A970F6}"/>
+              </a:ext>
+            </a:extLst>
+          </p:cNvPr>
+          <p:cNvCxnSpPr/>
+          <p:nvPr/>
+        </p:nvCxnSpPr>
+        <p:spPr>
+          <a:xfrm>
+            <a:off x="7532914" y="1828800"/>
+            <a:ext cx="1680755" cy="139337"/>
+          </a:xfrm>
+          <a:prstGeom prst="straightConnector1">
+            <a:avLst/>
+          </a:prstGeom>
+          <a:ln>
+            <a:solidFill>
+              <a:schemeClr val="accent3"/>
+            </a:solidFill>
+            <a:tailEnd type="triangle"/>
+          </a:ln>
+        </p:spPr>
+        <p:style>
+          <a:lnRef idx="1">
+            <a:schemeClr val="accent1"/>
+          </a:lnRef>
+          <a:fillRef idx="0">
+            <a:schemeClr val="accent1"/>
+          </a:fillRef>
+          <a:effectRef idx="0">
+            <a:schemeClr val="accent1"/>
+          </a:effectRef>
+          <a:fontRef idx="minor">
+            <a:schemeClr val="tx1"/>
+          </a:fontRef>
+        </p:style>
+      </p:cxnSp>
+      <p:cxnSp>
+        <p:nvCxnSpPr>
+          <p:cNvPr id="8" name="Gerade Verbindung mit Pfeil 7">
+            <a:extLst>
+              <a:ext uri="{FF2B5EF4-FFF2-40B4-BE49-F238E27FC236}">
+                <a16:creationId xmlns:a16="http://schemas.microsoft.com/office/drawing/2014/main" id="{49AFE1BA-2A4F-4D0E-94E6-59EF5B40073F}"/>
+              </a:ext>
+            </a:extLst>
+          </p:cNvPr>
+          <p:cNvCxnSpPr/>
+          <p:nvPr/>
+        </p:nvCxnSpPr>
+        <p:spPr>
+          <a:xfrm>
+            <a:off x="7515497" y="1837509"/>
+            <a:ext cx="1279071" cy="287382"/>
+          </a:xfrm>
+          <a:prstGeom prst="straightConnector1">
+            <a:avLst/>
+          </a:prstGeom>
+          <a:ln>
+            <a:solidFill>
+              <a:schemeClr val="accent3"/>
+            </a:solidFill>
+            <a:tailEnd type="triangle"/>
+          </a:ln>
+        </p:spPr>
+        <p:style>
+          <a:lnRef idx="1">
+            <a:schemeClr val="accent1"/>
+          </a:lnRef>
+          <a:fillRef idx="0">
+            <a:schemeClr val="accent1"/>
+          </a:fillRef>
+          <a:effectRef idx="0">
+            <a:schemeClr val="accent1"/>
+          </a:effectRef>
+          <a:fontRef idx="minor">
+            <a:schemeClr val="tx1"/>
+          </a:fontRef>
+        </p:style>
+      </p:cxnSp>
+      <p:cxnSp>
+        <p:nvCxnSpPr>
+          <p:cNvPr id="10" name="Gerade Verbindung mit Pfeil 9">
+            <a:extLst>
+              <a:ext uri="{FF2B5EF4-FFF2-40B4-BE49-F238E27FC236}">
+                <a16:creationId xmlns:a16="http://schemas.microsoft.com/office/drawing/2014/main" id="{B89A0429-75C2-4C17-B30F-F00B74C6DDAC}"/>
+              </a:ext>
+            </a:extLst>
+          </p:cNvPr>
+          <p:cNvCxnSpPr>
+            <a:cxnSpLocks/>
+          </p:cNvCxnSpPr>
+          <p:nvPr/>
+        </p:nvCxnSpPr>
+        <p:spPr>
+          <a:xfrm>
+            <a:off x="7267575" y="2133600"/>
+            <a:ext cx="2178727" cy="474689"/>
+          </a:xfrm>
+          <a:prstGeom prst="straightConnector1">
+            <a:avLst/>
+          </a:prstGeom>
+          <a:ln>
+            <a:solidFill>
+              <a:schemeClr val="accent3"/>
+            </a:solidFill>
+            <a:tailEnd type="triangle"/>
+          </a:ln>
+        </p:spPr>
+        <p:style>
+          <a:lnRef idx="1">
+            <a:schemeClr val="accent1"/>
+          </a:lnRef>
+          <a:fillRef idx="0">
+            <a:schemeClr val="accent1"/>
+          </a:fillRef>
+          <a:effectRef idx="0">
+            <a:schemeClr val="accent1"/>
+          </a:effectRef>
+          <a:fontRef idx="minor">
+            <a:schemeClr val="tx1"/>
+          </a:fontRef>
+        </p:style>
+      </p:cxnSp>
+      <p:pic>
+        <p:nvPicPr>
+          <p:cNvPr id="12" name="Grafik 11">
+            <a:extLst>
+              <a:ext uri="{FF2B5EF4-FFF2-40B4-BE49-F238E27FC236}">
+                <a16:creationId xmlns:a16="http://schemas.microsoft.com/office/drawing/2014/main" id="{E98691F9-74F1-4658-B738-0347BBB14346}"/>
+              </a:ext>
+            </a:extLst>
+          </p:cNvPr>
+          <p:cNvPicPr>
+            <a:picLocks noChangeAspect="1"/>
+          </p:cNvPicPr>
+          <p:nvPr/>
+        </p:nvPicPr>
+        <p:blipFill>
+          <a:blip r:embed="rId3"/>
+          <a:stretch>
+            <a:fillRect/>
+          </a:stretch>
+        </p:blipFill>
+        <p:spPr>
+          <a:xfrm>
+            <a:off x="8186056" y="3332333"/>
+            <a:ext cx="3377083" cy="1690923"/>
+          </a:xfrm>
+          <a:prstGeom prst="rect">
+            <a:avLst/>
+          </a:prstGeom>
+        </p:spPr>
+      </p:pic>
+      <p:cxnSp>
+        <p:nvCxnSpPr>
+          <p:cNvPr id="14" name="Gerade Verbindung mit Pfeil 13">
+            <a:extLst>
+              <a:ext uri="{FF2B5EF4-FFF2-40B4-BE49-F238E27FC236}">
+                <a16:creationId xmlns:a16="http://schemas.microsoft.com/office/drawing/2014/main" id="{92A5803A-8F75-4AC9-B736-5F3110859932}"/>
+              </a:ext>
+            </a:extLst>
+          </p:cNvPr>
+          <p:cNvCxnSpPr>
+            <a:cxnSpLocks/>
+          </p:cNvCxnSpPr>
+          <p:nvPr/>
+        </p:nvCxnSpPr>
+        <p:spPr>
+          <a:xfrm>
+            <a:off x="6896100" y="2800350"/>
+            <a:ext cx="3339414" cy="1449362"/>
+          </a:xfrm>
+          <a:prstGeom prst="straightConnector1">
+            <a:avLst/>
+          </a:prstGeom>
+          <a:ln>
+            <a:solidFill>
+              <a:schemeClr val="accent3"/>
+            </a:solidFill>
+            <a:tailEnd type="triangle"/>
+          </a:ln>
+        </p:spPr>
+        <p:style>
+          <a:lnRef idx="1">
+            <a:schemeClr val="accent1"/>
+          </a:lnRef>
+          <a:fillRef idx="0">
+            <a:schemeClr val="accent1"/>
+          </a:fillRef>
+          <a:effectRef idx="0">
+            <a:schemeClr val="accent1"/>
+          </a:effectRef>
+          <a:fontRef idx="minor">
+            <a:schemeClr val="tx1"/>
+          </a:fontRef>
+        </p:style>
+      </p:cxnSp>
+      <p:pic>
+        <p:nvPicPr>
+          <p:cNvPr id="16" name="Grafik 15">
+            <a:extLst>
+              <a:ext uri="{FF2B5EF4-FFF2-40B4-BE49-F238E27FC236}">
+                <a16:creationId xmlns:a16="http://schemas.microsoft.com/office/drawing/2014/main" id="{79A2B575-9D77-43B1-BFBF-DA0881EF543A}"/>
+              </a:ext>
+            </a:extLst>
+          </p:cNvPr>
+          <p:cNvPicPr>
+            <a:picLocks noChangeAspect="1"/>
+          </p:cNvPicPr>
+          <p:nvPr/>
+        </p:nvPicPr>
+        <p:blipFill>
+          <a:blip r:embed="rId4"/>
+          <a:stretch>
+            <a:fillRect/>
+          </a:stretch>
+        </p:blipFill>
+        <p:spPr>
+          <a:xfrm>
+            <a:off x="8185856" y="5279415"/>
+            <a:ext cx="3377083" cy="1432304"/>
+          </a:xfrm>
+          <a:prstGeom prst="rect">
+            <a:avLst/>
+          </a:prstGeom>
+        </p:spPr>
+      </p:pic>
+      <p:cxnSp>
+        <p:nvCxnSpPr>
+          <p:cNvPr id="17" name="Gerade Verbindung mit Pfeil 16">
+            <a:extLst>
+              <a:ext uri="{FF2B5EF4-FFF2-40B4-BE49-F238E27FC236}">
+                <a16:creationId xmlns:a16="http://schemas.microsoft.com/office/drawing/2014/main" id="{D473C946-6306-448B-9A2A-746A1BCD4127}"/>
+              </a:ext>
+            </a:extLst>
+          </p:cNvPr>
+          <p:cNvCxnSpPr>
+            <a:cxnSpLocks/>
+          </p:cNvCxnSpPr>
+          <p:nvPr/>
+        </p:nvCxnSpPr>
+        <p:spPr>
+          <a:xfrm>
+            <a:off x="6905625" y="2800350"/>
+            <a:ext cx="3181350" cy="3324225"/>
+          </a:xfrm>
+          <a:prstGeom prst="straightConnector1">
+            <a:avLst/>
+          </a:prstGeom>
+          <a:ln>
+            <a:solidFill>
+              <a:schemeClr val="accent3"/>
+            </a:solidFill>
+            <a:tailEnd type="triangle"/>
+          </a:ln>
+        </p:spPr>
+        <p:style>
+          <a:lnRef idx="1">
+            <a:schemeClr val="accent1"/>
+          </a:lnRef>
+          <a:fillRef idx="0">
+            <a:schemeClr val="accent1"/>
+          </a:fillRef>
+          <a:effectRef idx="0">
+            <a:schemeClr val="accent1"/>
+          </a:effectRef>
+          <a:fontRef idx="minor">
+            <a:schemeClr val="tx1"/>
+          </a:fontRef>
+        </p:style>
+      </p:cxnSp>
     </p:spTree>
     <p:extLst>
       <p:ext uri="{BB962C8B-B14F-4D97-AF65-F5344CB8AC3E}">
@@ -7142,6 +7465,700 @@
           <a:chExt cx="0" cy="0"/>
         </a:xfrm>
       </p:grpSpPr>
+      <p:pic>
+        <p:nvPicPr>
+          <p:cNvPr id="19" name="Grafik 18">
+            <a:extLst>
+              <a:ext uri="{FF2B5EF4-FFF2-40B4-BE49-F238E27FC236}">
+                <a16:creationId xmlns:a16="http://schemas.microsoft.com/office/drawing/2014/main" id="{1AAB221A-854C-4DB3-BB52-2BAB3EA1FC0F}"/>
+              </a:ext>
+            </a:extLst>
+          </p:cNvPr>
+          <p:cNvPicPr>
+            <a:picLocks noChangeAspect="1"/>
+          </p:cNvPicPr>
+          <p:nvPr/>
+        </p:nvPicPr>
+        <p:blipFill>
+          <a:blip r:embed="rId2"/>
+          <a:stretch>
+            <a:fillRect/>
+          </a:stretch>
+        </p:blipFill>
+        <p:spPr>
+          <a:xfrm>
+            <a:off x="7976717" y="3429000"/>
+            <a:ext cx="3377083" cy="2704136"/>
+          </a:xfrm>
+          <a:prstGeom prst="rect">
+            <a:avLst/>
+          </a:prstGeom>
+        </p:spPr>
+      </p:pic>
+      <p:pic>
+        <p:nvPicPr>
+          <p:cNvPr id="16" name="Grafik 15">
+            <a:extLst>
+              <a:ext uri="{FF2B5EF4-FFF2-40B4-BE49-F238E27FC236}">
+                <a16:creationId xmlns:a16="http://schemas.microsoft.com/office/drawing/2014/main" id="{79A2B575-9D77-43B1-BFBF-DA0881EF543A}"/>
+              </a:ext>
+            </a:extLst>
+          </p:cNvPr>
+          <p:cNvPicPr>
+            <a:picLocks noChangeAspect="1"/>
+          </p:cNvPicPr>
+          <p:nvPr/>
+        </p:nvPicPr>
+        <p:blipFill>
+          <a:blip r:embed="rId3"/>
+          <a:stretch>
+            <a:fillRect/>
+          </a:stretch>
+        </p:blipFill>
+        <p:spPr>
+          <a:xfrm>
+            <a:off x="7976717" y="1807973"/>
+            <a:ext cx="3377083" cy="1432304"/>
+          </a:xfrm>
+          <a:prstGeom prst="rect">
+            <a:avLst/>
+          </a:prstGeom>
+        </p:spPr>
+      </p:pic>
+      <p:sp>
+        <p:nvSpPr>
+          <p:cNvPr id="2" name="Titel 1">
+            <a:extLst>
+              <a:ext uri="{FF2B5EF4-FFF2-40B4-BE49-F238E27FC236}">
+                <a16:creationId xmlns:a16="http://schemas.microsoft.com/office/drawing/2014/main" id="{FCD5F9FF-D75D-4F13-83F9-85858510022E}"/>
+              </a:ext>
+            </a:extLst>
+          </p:cNvPr>
+          <p:cNvSpPr>
+            <a:spLocks noGrp="1"/>
+          </p:cNvSpPr>
+          <p:nvPr>
+            <p:ph type="title"/>
+          </p:nvPr>
+        </p:nvSpPr>
+        <p:spPr/>
+        <p:txBody>
+          <a:bodyPr/>
+          <a:lstStyle/>
+          <a:p>
+            <a:r>
+              <a:rPr lang="en-US" dirty="0"/>
+              <a:t>Game Actors: active actors: tank chassis</a:t>
+            </a:r>
+          </a:p>
+        </p:txBody>
+      </p:sp>
+      <p:sp>
+        <p:nvSpPr>
+          <p:cNvPr id="3" name="Textfeld 2">
+            <a:extLst>
+              <a:ext uri="{FF2B5EF4-FFF2-40B4-BE49-F238E27FC236}">
+                <a16:creationId xmlns:a16="http://schemas.microsoft.com/office/drawing/2014/main" id="{6FE74840-8406-4208-AC34-C0AEF3BC43B2}"/>
+              </a:ext>
+            </a:extLst>
+          </p:cNvPr>
+          <p:cNvSpPr txBox="1"/>
+          <p:nvPr/>
+        </p:nvSpPr>
+        <p:spPr>
+          <a:xfrm>
+            <a:off x="483764" y="1377709"/>
+            <a:ext cx="7432327" cy="4524315"/>
+          </a:xfrm>
+          <a:prstGeom prst="rect">
+            <a:avLst/>
+          </a:prstGeom>
+          <a:noFill/>
+        </p:spPr>
+        <p:txBody>
+          <a:bodyPr wrap="square" rtlCol="0">
+            <a:spAutoFit/>
+          </a:bodyPr>
+          <a:lstStyle/>
+          <a:p>
+            <a:r>
+              <a:rPr lang="en-US" dirty="0"/>
+              <a:t>The tank chassis have the following components that may act independent while moving or rotating:</a:t>
+            </a:r>
+          </a:p>
+          <a:p>
+            <a:pPr marL="342900" indent="-342900">
+              <a:buFont typeface="+mj-lt"/>
+              <a:buAutoNum type="arabicPeriod"/>
+            </a:pPr>
+            <a:r>
+              <a:rPr lang="en-US" dirty="0"/>
+              <a:t>Main body chassis (called in Blender “</a:t>
+            </a:r>
+            <a:r>
+              <a:rPr lang="en-US" i="1" dirty="0" err="1">
+                <a:solidFill>
+                  <a:srgbClr val="00B050"/>
+                </a:solidFill>
+              </a:rPr>
+              <a:t>Tank_Chassy</a:t>
+            </a:r>
+            <a:r>
+              <a:rPr lang="en-US" dirty="0"/>
+              <a:t>” will contain also </a:t>
+            </a:r>
+            <a:r>
+              <a:rPr lang="en-US" b="1" u="sng" dirty="0"/>
+              <a:t>lights embedded</a:t>
+            </a:r>
+            <a:r>
+              <a:rPr lang="en-US" dirty="0"/>
+              <a:t>. The only way to control the lights ON/OFF is by changing the materials “</a:t>
+            </a:r>
+            <a:r>
+              <a:rPr lang="en-US" i="1" dirty="0" err="1">
+                <a:solidFill>
+                  <a:srgbClr val="00B050"/>
+                </a:solidFill>
+              </a:rPr>
+              <a:t>Material.LightOn</a:t>
+            </a:r>
+            <a:r>
+              <a:rPr lang="en-US" dirty="0"/>
+              <a:t>” with “</a:t>
+            </a:r>
+            <a:r>
+              <a:rPr lang="en-US" i="1" dirty="0" err="1">
+                <a:solidFill>
+                  <a:srgbClr val="00B050"/>
+                </a:solidFill>
+              </a:rPr>
+              <a:t>Material.LightOff</a:t>
+            </a:r>
+            <a:r>
+              <a:rPr lang="en-US" dirty="0"/>
+              <a:t>” each other. </a:t>
+            </a:r>
+            <a:br>
+              <a:rPr lang="en-US" dirty="0"/>
+            </a:br>
+            <a:endParaRPr lang="en-US" dirty="0"/>
+          </a:p>
+          <a:p>
+            <a:pPr marL="342900" indent="-342900">
+              <a:buFont typeface="+mj-lt"/>
+              <a:buAutoNum type="arabicPeriod"/>
+            </a:pPr>
+            <a:r>
+              <a:rPr lang="en-US" dirty="0"/>
+              <a:t>Tracks and/or wheels are separated left from links as well as separated from the main body:</a:t>
+            </a:r>
+          </a:p>
+          <a:p>
+            <a:pPr marL="800100" lvl="1" indent="-342900">
+              <a:buFont typeface="Arial" panose="020B0604020202020204" pitchFamily="34" charset="0"/>
+              <a:buChar char="•"/>
+            </a:pPr>
+            <a:r>
+              <a:rPr lang="en-US" i="1" dirty="0" err="1">
+                <a:solidFill>
+                  <a:srgbClr val="00B050"/>
+                </a:solidFill>
+              </a:rPr>
+              <a:t>Track_Right</a:t>
+            </a:r>
+            <a:endParaRPr lang="en-US" i="1" dirty="0">
+              <a:solidFill>
+                <a:srgbClr val="00B050"/>
+              </a:solidFill>
+            </a:endParaRPr>
+          </a:p>
+          <a:p>
+            <a:pPr marL="800100" lvl="1" indent="-342900">
+              <a:buFont typeface="Arial" panose="020B0604020202020204" pitchFamily="34" charset="0"/>
+              <a:buChar char="•"/>
+            </a:pPr>
+            <a:r>
+              <a:rPr lang="en-US" i="1" dirty="0" err="1">
+                <a:solidFill>
+                  <a:srgbClr val="00B050"/>
+                </a:solidFill>
+              </a:rPr>
+              <a:t>Track_Left</a:t>
+            </a:r>
+            <a:endParaRPr lang="en-US" i="1" dirty="0">
+              <a:solidFill>
+                <a:srgbClr val="00B050"/>
+              </a:solidFill>
+            </a:endParaRPr>
+          </a:p>
+          <a:p>
+            <a:endParaRPr lang="en-US" dirty="0"/>
+          </a:p>
+          <a:p>
+            <a:r>
+              <a:rPr lang="en-US" dirty="0"/>
+              <a:t>The tank chassis properties: </a:t>
+            </a:r>
+          </a:p>
+          <a:p>
+            <a:pPr marL="342900" indent="-342900">
+              <a:buAutoNum type="arabicPeriod"/>
+            </a:pPr>
+            <a:r>
+              <a:rPr lang="en-US" dirty="0"/>
+              <a:t>Point of symmetry</a:t>
+            </a:r>
+          </a:p>
+          <a:p>
+            <a:pPr marL="342900" indent="-342900">
+              <a:buAutoNum type="arabicPeriod"/>
+            </a:pPr>
+            <a:r>
+              <a:rPr lang="en-US" dirty="0">
+                <a:highlight>
+                  <a:srgbClr val="FFFF00"/>
+                </a:highlight>
+              </a:rPr>
+              <a:t>TBD</a:t>
+            </a:r>
+          </a:p>
+          <a:p>
+            <a:pPr marL="342900" indent="-342900">
+              <a:buAutoNum type="arabicPeriod"/>
+            </a:pPr>
+            <a:r>
+              <a:rPr lang="en-US" dirty="0"/>
+              <a:t>…</a:t>
+            </a:r>
+          </a:p>
+        </p:txBody>
+      </p:sp>
+      <p:cxnSp>
+        <p:nvCxnSpPr>
+          <p:cNvPr id="6" name="Gerade Verbindung mit Pfeil 5">
+            <a:extLst>
+              <a:ext uri="{FF2B5EF4-FFF2-40B4-BE49-F238E27FC236}">
+                <a16:creationId xmlns:a16="http://schemas.microsoft.com/office/drawing/2014/main" id="{C0450ACC-A824-45FD-9BEB-49AFD8A970F6}"/>
+              </a:ext>
+            </a:extLst>
+          </p:cNvPr>
+          <p:cNvCxnSpPr>
+            <a:cxnSpLocks/>
+          </p:cNvCxnSpPr>
+          <p:nvPr/>
+        </p:nvCxnSpPr>
+        <p:spPr>
+          <a:xfrm>
+            <a:off x="2476500" y="4307239"/>
+            <a:ext cx="6210300" cy="1173052"/>
+          </a:xfrm>
+          <a:prstGeom prst="straightConnector1">
+            <a:avLst/>
+          </a:prstGeom>
+          <a:ln>
+            <a:solidFill>
+              <a:schemeClr val="accent3"/>
+            </a:solidFill>
+            <a:tailEnd type="triangle"/>
+          </a:ln>
+        </p:spPr>
+        <p:style>
+          <a:lnRef idx="1">
+            <a:schemeClr val="accent1"/>
+          </a:lnRef>
+          <a:fillRef idx="0">
+            <a:schemeClr val="accent1"/>
+          </a:fillRef>
+          <a:effectRef idx="0">
+            <a:schemeClr val="accent1"/>
+          </a:effectRef>
+          <a:fontRef idx="minor">
+            <a:schemeClr val="tx1"/>
+          </a:fontRef>
+        </p:style>
+      </p:cxnSp>
+      <p:cxnSp>
+        <p:nvCxnSpPr>
+          <p:cNvPr id="8" name="Gerade Verbindung mit Pfeil 7">
+            <a:extLst>
+              <a:ext uri="{FF2B5EF4-FFF2-40B4-BE49-F238E27FC236}">
+                <a16:creationId xmlns:a16="http://schemas.microsoft.com/office/drawing/2014/main" id="{49AFE1BA-2A4F-4D0E-94E6-59EF5B40073F}"/>
+              </a:ext>
+            </a:extLst>
+          </p:cNvPr>
+          <p:cNvCxnSpPr>
+            <a:cxnSpLocks/>
+          </p:cNvCxnSpPr>
+          <p:nvPr/>
+        </p:nvCxnSpPr>
+        <p:spPr>
+          <a:xfrm>
+            <a:off x="2552700" y="4127836"/>
+            <a:ext cx="7791450" cy="1401778"/>
+          </a:xfrm>
+          <a:prstGeom prst="straightConnector1">
+            <a:avLst/>
+          </a:prstGeom>
+          <a:ln>
+            <a:solidFill>
+              <a:schemeClr val="accent3"/>
+            </a:solidFill>
+            <a:tailEnd type="triangle"/>
+          </a:ln>
+        </p:spPr>
+        <p:style>
+          <a:lnRef idx="1">
+            <a:schemeClr val="accent1"/>
+          </a:lnRef>
+          <a:fillRef idx="0">
+            <a:schemeClr val="accent1"/>
+          </a:fillRef>
+          <a:effectRef idx="0">
+            <a:schemeClr val="accent1"/>
+          </a:effectRef>
+          <a:fontRef idx="minor">
+            <a:schemeClr val="tx1"/>
+          </a:fontRef>
+        </p:style>
+      </p:cxnSp>
+      <p:cxnSp>
+        <p:nvCxnSpPr>
+          <p:cNvPr id="14" name="Gerade Verbindung mit Pfeil 13">
+            <a:extLst>
+              <a:ext uri="{FF2B5EF4-FFF2-40B4-BE49-F238E27FC236}">
+                <a16:creationId xmlns:a16="http://schemas.microsoft.com/office/drawing/2014/main" id="{92A5803A-8F75-4AC9-B736-5F3110859932}"/>
+              </a:ext>
+            </a:extLst>
+          </p:cNvPr>
+          <p:cNvCxnSpPr>
+            <a:cxnSpLocks/>
+          </p:cNvCxnSpPr>
+          <p:nvPr/>
+        </p:nvCxnSpPr>
+        <p:spPr>
+          <a:xfrm>
+            <a:off x="6591300" y="2238375"/>
+            <a:ext cx="3238500" cy="431995"/>
+          </a:xfrm>
+          <a:prstGeom prst="straightConnector1">
+            <a:avLst/>
+          </a:prstGeom>
+          <a:ln>
+            <a:solidFill>
+              <a:schemeClr val="accent3"/>
+            </a:solidFill>
+            <a:tailEnd type="triangle"/>
+          </a:ln>
+        </p:spPr>
+        <p:style>
+          <a:lnRef idx="1">
+            <a:schemeClr val="accent1"/>
+          </a:lnRef>
+          <a:fillRef idx="0">
+            <a:schemeClr val="accent1"/>
+          </a:fillRef>
+          <a:effectRef idx="0">
+            <a:schemeClr val="accent1"/>
+          </a:effectRef>
+          <a:fontRef idx="minor">
+            <a:schemeClr val="tx1"/>
+          </a:fontRef>
+        </p:style>
+      </p:cxnSp>
+      <p:sp>
+        <p:nvSpPr>
+          <p:cNvPr id="27" name="Rechteck 26">
+            <a:extLst>
+              <a:ext uri="{FF2B5EF4-FFF2-40B4-BE49-F238E27FC236}">
+                <a16:creationId xmlns:a16="http://schemas.microsoft.com/office/drawing/2014/main" id="{75E88D54-1D90-4CC9-9510-6235FE56402A}"/>
+              </a:ext>
+            </a:extLst>
+          </p:cNvPr>
+          <p:cNvSpPr/>
+          <p:nvPr/>
+        </p:nvSpPr>
+        <p:spPr>
+          <a:xfrm>
+            <a:off x="7976717" y="3429000"/>
+            <a:ext cx="1181100" cy="188724"/>
+          </a:xfrm>
+          <a:prstGeom prst="rect">
+            <a:avLst/>
+          </a:prstGeom>
+        </p:spPr>
+        <p:style>
+          <a:lnRef idx="2">
+            <a:schemeClr val="accent1">
+              <a:shade val="50000"/>
+            </a:schemeClr>
+          </a:lnRef>
+          <a:fillRef idx="1">
+            <a:schemeClr val="accent1"/>
+          </a:fillRef>
+          <a:effectRef idx="0">
+            <a:schemeClr val="accent1"/>
+          </a:effectRef>
+          <a:fontRef idx="minor">
+            <a:schemeClr val="lt1"/>
+          </a:fontRef>
+        </p:style>
+        <p:txBody>
+          <a:bodyPr rtlCol="0" anchor="ctr"/>
+          <a:lstStyle/>
+          <a:p>
+            <a:pPr algn="ctr"/>
+            <a:r>
+              <a:rPr lang="en-US" dirty="0"/>
+              <a:t>Front side</a:t>
+            </a:r>
+          </a:p>
+        </p:txBody>
+      </p:sp>
+    </p:spTree>
+    <p:extLst>
+      <p:ext uri="{BB962C8B-B14F-4D97-AF65-F5344CB8AC3E}">
+        <p14:creationId xmlns:p14="http://schemas.microsoft.com/office/powerpoint/2010/main" val="1907348010"/>
+      </p:ext>
+    </p:extLst>
+  </p:cSld>
+  <p:clrMapOvr>
+    <a:masterClrMapping/>
+  </p:clrMapOvr>
+</p:sld>
+</file>
+
+<file path=ppt/slides/slide14.xml><?xml version="1.0" encoding="utf-8"?>
+<p:sld xmlns:a="http://schemas.openxmlformats.org/drawingml/2006/main" xmlns:r="http://schemas.openxmlformats.org/officeDocument/2006/relationships" xmlns:p="http://schemas.openxmlformats.org/presentationml/2006/main">
+  <p:cSld>
+    <p:spTree>
+      <p:nvGrpSpPr>
+        <p:cNvPr id="1" name=""/>
+        <p:cNvGrpSpPr/>
+        <p:nvPr/>
+      </p:nvGrpSpPr>
+      <p:grpSpPr>
+        <a:xfrm>
+          <a:off x="0" y="0"/>
+          <a:ext cx="0" cy="0"/>
+          <a:chOff x="0" y="0"/>
+          <a:chExt cx="0" cy="0"/>
+        </a:xfrm>
+      </p:grpSpPr>
+      <p:sp>
+        <p:nvSpPr>
+          <p:cNvPr id="2" name="Titel 1">
+            <a:extLst>
+              <a:ext uri="{FF2B5EF4-FFF2-40B4-BE49-F238E27FC236}">
+                <a16:creationId xmlns:a16="http://schemas.microsoft.com/office/drawing/2014/main" id="{DCA3A5A7-2703-4D94-8C75-1B29237BD2BE}"/>
+              </a:ext>
+            </a:extLst>
+          </p:cNvPr>
+          <p:cNvSpPr>
+            <a:spLocks noGrp="1"/>
+          </p:cNvSpPr>
+          <p:nvPr>
+            <p:ph type="title"/>
+          </p:nvPr>
+        </p:nvSpPr>
+        <p:spPr/>
+        <p:txBody>
+          <a:bodyPr/>
+          <a:lstStyle/>
+          <a:p>
+            <a:r>
+              <a:rPr lang="en-US" dirty="0"/>
+              <a:t>Game Actors: ..: tank chassis: A-Type</a:t>
+            </a:r>
+          </a:p>
+        </p:txBody>
+      </p:sp>
+      <p:sp>
+        <p:nvSpPr>
+          <p:cNvPr id="3" name="Textfeld 2">
+            <a:extLst>
+              <a:ext uri="{FF2B5EF4-FFF2-40B4-BE49-F238E27FC236}">
+                <a16:creationId xmlns:a16="http://schemas.microsoft.com/office/drawing/2014/main" id="{123F72B4-3141-4FA1-9CBA-1DE6CF3A996C}"/>
+              </a:ext>
+            </a:extLst>
+          </p:cNvPr>
+          <p:cNvSpPr txBox="1"/>
+          <p:nvPr/>
+        </p:nvSpPr>
+        <p:spPr>
+          <a:xfrm>
+            <a:off x="483764" y="1377709"/>
+            <a:ext cx="7432327" cy="2031325"/>
+          </a:xfrm>
+          <a:prstGeom prst="rect">
+            <a:avLst/>
+          </a:prstGeom>
+          <a:noFill/>
+        </p:spPr>
+        <p:txBody>
+          <a:bodyPr wrap="square" rtlCol="0">
+            <a:spAutoFit/>
+          </a:bodyPr>
+          <a:lstStyle/>
+          <a:p>
+            <a:r>
+              <a:rPr lang="en-US" dirty="0"/>
+              <a:t>The tank chassis of A-Type is a lightweight chassis designed for speed and maneuverability.</a:t>
+            </a:r>
+          </a:p>
+          <a:p>
+            <a:r>
+              <a:rPr lang="en-US" dirty="0"/>
+              <a:t>Main characteristics:</a:t>
+            </a:r>
+          </a:p>
+          <a:p>
+            <a:pPr marL="342900" indent="-342900">
+              <a:buFont typeface="+mj-lt"/>
+              <a:buAutoNum type="arabicPeriod"/>
+            </a:pPr>
+            <a:r>
+              <a:rPr lang="en-US" b="1" dirty="0"/>
+              <a:t>Point of  symmetry</a:t>
+            </a:r>
+            <a:r>
+              <a:rPr lang="en-US" dirty="0"/>
+              <a:t>, as defined in Blender: </a:t>
+            </a:r>
+          </a:p>
+          <a:p>
+            <a:pPr marL="742950" lvl="1" indent="-285750">
+              <a:buFontTx/>
+              <a:buChar char="-"/>
+            </a:pPr>
+            <a:r>
+              <a:rPr lang="en-US" dirty="0"/>
+              <a:t>X: 0.5</a:t>
+            </a:r>
+          </a:p>
+          <a:p>
+            <a:pPr marL="742950" lvl="1" indent="-285750">
+              <a:buFontTx/>
+              <a:buChar char="-"/>
+            </a:pPr>
+            <a:r>
+              <a:rPr lang="en-US" dirty="0"/>
+              <a:t>Y: 0.5</a:t>
+            </a:r>
+          </a:p>
+          <a:p>
+            <a:pPr marL="742950" lvl="1" indent="-285750">
+              <a:buFontTx/>
+              <a:buChar char="-"/>
+            </a:pPr>
+            <a:r>
+              <a:rPr lang="en-US" dirty="0"/>
+              <a:t>Z: 0.186</a:t>
+            </a:r>
+          </a:p>
+        </p:txBody>
+      </p:sp>
+      <p:pic>
+        <p:nvPicPr>
+          <p:cNvPr id="4" name="Grafik 3">
+            <a:extLst>
+              <a:ext uri="{FF2B5EF4-FFF2-40B4-BE49-F238E27FC236}">
+                <a16:creationId xmlns:a16="http://schemas.microsoft.com/office/drawing/2014/main" id="{53519332-36D1-431C-B72E-58C7C5CFAAD6}"/>
+              </a:ext>
+            </a:extLst>
+          </p:cNvPr>
+          <p:cNvPicPr>
+            <a:picLocks noChangeAspect="1"/>
+          </p:cNvPicPr>
+          <p:nvPr/>
+        </p:nvPicPr>
+        <p:blipFill>
+          <a:blip r:embed="rId2"/>
+          <a:stretch>
+            <a:fillRect/>
+          </a:stretch>
+        </p:blipFill>
+        <p:spPr>
+          <a:xfrm>
+            <a:off x="8335512" y="1762125"/>
+            <a:ext cx="3232630" cy="2283337"/>
+          </a:xfrm>
+          <a:prstGeom prst="rect">
+            <a:avLst/>
+          </a:prstGeom>
+        </p:spPr>
+      </p:pic>
+      <p:cxnSp>
+        <p:nvCxnSpPr>
+          <p:cNvPr id="5" name="Gerade Verbindung mit Pfeil 4">
+            <a:extLst>
+              <a:ext uri="{FF2B5EF4-FFF2-40B4-BE49-F238E27FC236}">
+                <a16:creationId xmlns:a16="http://schemas.microsoft.com/office/drawing/2014/main" id="{B19EA477-600C-4B5E-AEF8-EFB5376498F7}"/>
+              </a:ext>
+            </a:extLst>
+          </p:cNvPr>
+          <p:cNvCxnSpPr>
+            <a:cxnSpLocks/>
+          </p:cNvCxnSpPr>
+          <p:nvPr/>
+        </p:nvCxnSpPr>
+        <p:spPr>
+          <a:xfrm flipV="1">
+            <a:off x="2247900" y="2791914"/>
+            <a:ext cx="7703927" cy="122736"/>
+          </a:xfrm>
+          <a:prstGeom prst="straightConnector1">
+            <a:avLst/>
+          </a:prstGeom>
+          <a:ln>
+            <a:tailEnd type="triangle"/>
+          </a:ln>
+        </p:spPr>
+        <p:style>
+          <a:lnRef idx="1">
+            <a:schemeClr val="accent1"/>
+          </a:lnRef>
+          <a:fillRef idx="0">
+            <a:schemeClr val="accent1"/>
+          </a:fillRef>
+          <a:effectRef idx="0">
+            <a:schemeClr val="accent1"/>
+          </a:effectRef>
+          <a:fontRef idx="minor">
+            <a:schemeClr val="tx1"/>
+          </a:fontRef>
+        </p:style>
+      </p:cxnSp>
+    </p:spTree>
+    <p:extLst>
+      <p:ext uri="{BB962C8B-B14F-4D97-AF65-F5344CB8AC3E}">
+        <p14:creationId xmlns:p14="http://schemas.microsoft.com/office/powerpoint/2010/main" val="468648261"/>
+      </p:ext>
+    </p:extLst>
+  </p:cSld>
+  <p:clrMapOvr>
+    <a:masterClrMapping/>
+  </p:clrMapOvr>
+</p:sld>
+</file>
+
+<file path=ppt/slides/slide15.xml><?xml version="1.0" encoding="utf-8"?>
+<p:sld xmlns:a="http://schemas.openxmlformats.org/drawingml/2006/main" xmlns:r="http://schemas.openxmlformats.org/officeDocument/2006/relationships" xmlns:p="http://schemas.openxmlformats.org/presentationml/2006/main">
+  <p:cSld>
+    <p:spTree>
+      <p:nvGrpSpPr>
+        <p:cNvPr id="1" name=""/>
+        <p:cNvGrpSpPr/>
+        <p:nvPr/>
+      </p:nvGrpSpPr>
+      <p:grpSpPr>
+        <a:xfrm>
+          <a:off x="0" y="0"/>
+          <a:ext cx="0" cy="0"/>
+          <a:chOff x="0" y="0"/>
+          <a:chExt cx="0" cy="0"/>
+        </a:xfrm>
+      </p:grpSpPr>
       <p:sp>
         <p:nvSpPr>
           <p:cNvPr id="2" name="Titel 1">
@@ -7184,7 +8201,7 @@
 </p:sld>
 </file>
 
-<file path=ppt/slides/slide14.xml><?xml version="1.0" encoding="utf-8"?>
+<file path=ppt/slides/slide16.xml><?xml version="1.0" encoding="utf-8"?>
 <p:sld xmlns:a="http://schemas.openxmlformats.org/drawingml/2006/main" xmlns:r="http://schemas.openxmlformats.org/officeDocument/2006/relationships" xmlns:p="http://schemas.openxmlformats.org/presentationml/2006/main">
   <p:cSld>
     <p:spTree>
@@ -8271,7 +9288,7 @@
 </p:sld>
 </file>
 
-<file path=ppt/slides/slide15.xml><?xml version="1.0" encoding="utf-8"?>
+<file path=ppt/slides/slide17.xml><?xml version="1.0" encoding="utf-8"?>
 <p:sld xmlns:a="http://schemas.openxmlformats.org/drawingml/2006/main" xmlns:r="http://schemas.openxmlformats.org/officeDocument/2006/relationships" xmlns:p="http://schemas.openxmlformats.org/presentationml/2006/main">
   <p:cSld>
     <p:spTree>
@@ -8855,7 +9872,7 @@
 </p:sld>
 </file>
 
-<file path=ppt/slides/slide16.xml><?xml version="1.0" encoding="utf-8"?>
+<file path=ppt/slides/slide18.xml><?xml version="1.0" encoding="utf-8"?>
 <p:sld xmlns:a="http://schemas.openxmlformats.org/drawingml/2006/main" xmlns:r="http://schemas.openxmlformats.org/officeDocument/2006/relationships" xmlns:p="http://schemas.openxmlformats.org/presentationml/2006/main">
   <p:cSld>
     <p:spTree>
@@ -9891,7 +10908,7 @@
 </p:sld>
 </file>
 
-<file path=ppt/slides/slide17.xml><?xml version="1.0" encoding="utf-8"?>
+<file path=ppt/slides/slide19.xml><?xml version="1.0" encoding="utf-8"?>
 <p:sld xmlns:a="http://schemas.openxmlformats.org/drawingml/2006/main" xmlns:r="http://schemas.openxmlformats.org/officeDocument/2006/relationships" xmlns:p="http://schemas.openxmlformats.org/presentationml/2006/main">
   <p:cSld>
     <p:spTree>
@@ -10447,8 +11464,17 @@
           <a:p>
             <a:r>
               <a:rPr lang="en-US" dirty="0"/>
-              <a:t>Passive elements</a:t>
-            </a:r>
+              <a:t>Passive </a:t>
+            </a:r>
+            <a:r>
+              <a:rPr lang="en-US" i="1" dirty="0">
+                <a:solidFill>
+                  <a:schemeClr val="accent2"/>
+                </a:solidFill>
+              </a:rPr>
+              <a:t>actors</a:t>
+            </a:r>
+            <a:endParaRPr lang="en-US" dirty="0"/>
           </a:p>
         </p:txBody>
       </p:sp>
@@ -10579,7 +11605,7 @@
         <p:spPr>
           <a:xfrm>
             <a:off x="4021262" y="5884116"/>
-            <a:ext cx="1191237" cy="923330"/>
+            <a:ext cx="1191237" cy="646331"/>
           </a:xfrm>
           <a:prstGeom prst="rect">
             <a:avLst/>
@@ -10594,7 +11620,7 @@
           <a:p>
             <a:r>
               <a:rPr lang="en-US" dirty="0"/>
-              <a:t>Active element (“</a:t>
+              <a:t>Active </a:t>
             </a:r>
             <a:r>
               <a:rPr lang="en-US" i="1" dirty="0">
@@ -10604,10 +11630,7 @@
               </a:rPr>
               <a:t>actors</a:t>
             </a:r>
-            <a:r>
-              <a:rPr lang="en-US" dirty="0"/>
-              <a:t>”)</a:t>
-            </a:r>
+            <a:endParaRPr lang="en-US" dirty="0"/>
           </a:p>
         </p:txBody>
       </p:sp>
@@ -12428,23 +13451,6 @@
 </file>
 
 <file path=customXml/item1.xml><?xml version="1.0" encoding="utf-8"?>
-<p:properties xmlns:p="http://schemas.microsoft.com/office/2006/metadata/properties" xmlns:xsi="http://www.w3.org/2001/XMLSchema-instance" xmlns:pc="http://schemas.microsoft.com/office/infopath/2007/PartnerControls">
-  <documentManagement>
-    <MediaServiceKeyPoints xmlns="71af3243-3dd4-4a8d-8c0d-dd76da1f02a5" xsi:nil="true"/>
-  </documentManagement>
-</p:properties>
-</file>
-
-<file path=customXml/item2.xml><?xml version="1.0" encoding="utf-8"?>
-<?mso-contentType ?>
-<FormTemplates xmlns="http://schemas.microsoft.com/sharepoint/v3/contenttype/forms">
-  <Display>DocumentLibraryForm</Display>
-  <Edit>DocumentLibraryForm</Edit>
-  <New>DocumentLibraryForm</New>
-</FormTemplates>
-</file>
-
-<file path=customXml/item3.xml><?xml version="1.0" encoding="utf-8"?>
 <ct:contentTypeSchema xmlns:ct="http://schemas.microsoft.com/office/2006/metadata/contentType" xmlns:ma="http://schemas.microsoft.com/office/2006/metadata/properties/metaAttributes" ct:_="" ma:_="" ma:contentTypeName="Document" ma:contentTypeID="0x01010079F111ED35F8CC479449609E8A0923A6" ma:contentTypeVersion="11" ma:contentTypeDescription="Create a new document." ma:contentTypeScope="" ma:versionID="96291512c1ee715ab617f4c07df79fc1">
   <xsd:schema xmlns:xsd="http://www.w3.org/2001/XMLSchema" xmlns:xs="http://www.w3.org/2001/XMLSchema" xmlns:p="http://schemas.microsoft.com/office/2006/metadata/properties" xmlns:ns2="71af3243-3dd4-4a8d-8c0d-dd76da1f02a5" xmlns:ns3="16c05727-aa75-4e4a-9b5f-8a80a1165891" targetNamespace="http://schemas.microsoft.com/office/2006/metadata/properties" ma:root="true" ma:fieldsID="8256c27c40ca5c40ce1cf6c44f0205df" ns2:_="" ns3:_="">
     <xsd:import namespace="71af3243-3dd4-4a8d-8c0d-dd76da1f02a5"/>
@@ -12655,25 +13661,24 @@
 </ct:contentTypeSchema>
 </file>
 
-<file path=customXml/itemProps1.xml><?xml version="1.0" encoding="utf-8"?>
-<ds:datastoreItem xmlns:ds="http://schemas.openxmlformats.org/officeDocument/2006/customXml" ds:itemID="{979A33E2-B943-47EB-A0F4-8C84503D162A}">
-  <ds:schemaRefs>
-    <ds:schemaRef ds:uri="http://schemas.microsoft.com/office/2006/metadata/properties"/>
-    <ds:schemaRef ds:uri="http://schemas.microsoft.com/office/infopath/2007/PartnerControls"/>
-    <ds:schemaRef ds:uri="71af3243-3dd4-4a8d-8c0d-dd76da1f02a5"/>
-  </ds:schemaRefs>
-</ds:datastoreItem>
+<file path=customXml/item2.xml><?xml version="1.0" encoding="utf-8"?>
+<?mso-contentType ?>
+<FormTemplates xmlns="http://schemas.microsoft.com/sharepoint/v3/contenttype/forms">
+  <Display>DocumentLibraryForm</Display>
+  <Edit>DocumentLibraryForm</Edit>
+  <New>DocumentLibraryForm</New>
+</FormTemplates>
 </file>
 
-<file path=customXml/itemProps2.xml><?xml version="1.0" encoding="utf-8"?>
-<ds:datastoreItem xmlns:ds="http://schemas.openxmlformats.org/officeDocument/2006/customXml" ds:itemID="{25D76B92-E0A9-498F-A983-7D112F530EAB}">
-  <ds:schemaRefs>
-    <ds:schemaRef ds:uri="http://schemas.microsoft.com/sharepoint/v3/contenttype/forms"/>
-  </ds:schemaRefs>
-</ds:datastoreItem>
+<file path=customXml/item3.xml><?xml version="1.0" encoding="utf-8"?>
+<p:properties xmlns:p="http://schemas.microsoft.com/office/2006/metadata/properties" xmlns:xsi="http://www.w3.org/2001/XMLSchema-instance" xmlns:pc="http://schemas.microsoft.com/office/infopath/2007/PartnerControls">
+  <documentManagement>
+    <MediaServiceKeyPoints xmlns="71af3243-3dd4-4a8d-8c0d-dd76da1f02a5" xsi:nil="true"/>
+  </documentManagement>
+</p:properties>
 </file>
 
-<file path=customXml/itemProps3.xml><?xml version="1.0" encoding="utf-8"?>
+<file path=customXml/itemProps1.xml><?xml version="1.0" encoding="utf-8"?>
 <ds:datastoreItem xmlns:ds="http://schemas.openxmlformats.org/officeDocument/2006/customXml" ds:itemID="{954BF5EA-3A1C-42A7-8861-03D68A95C932}">
   <ds:schemaRefs>
     <ds:schemaRef ds:uri="http://schemas.microsoft.com/office/2006/metadata/contentType"/>
@@ -12690,4 +13695,29 @@
     <ds:schemaRef ds:uri="http://schemas.microsoft.com/internal/obd"/>
   </ds:schemaRefs>
 </ds:datastoreItem>
+</file>
+
+<file path=customXml/itemProps2.xml><?xml version="1.0" encoding="utf-8"?>
+<ds:datastoreItem xmlns:ds="http://schemas.openxmlformats.org/officeDocument/2006/customXml" ds:itemID="{25D76B92-E0A9-498F-A983-7D112F530EAB}">
+  <ds:schemaRefs>
+    <ds:schemaRef ds:uri="http://schemas.microsoft.com/sharepoint/v3/contenttype/forms"/>
+  </ds:schemaRefs>
+</ds:datastoreItem>
+</file>
+
+<file path=customXml/itemProps3.xml><?xml version="1.0" encoding="utf-8"?>
+<ds:datastoreItem xmlns:ds="http://schemas.openxmlformats.org/officeDocument/2006/customXml" ds:itemID="{979A33E2-B943-47EB-A0F4-8C84503D162A}">
+  <ds:schemaRefs>
+    <ds:schemaRef ds:uri="http://purl.org/dc/terms/"/>
+    <ds:schemaRef ds:uri="71af3243-3dd4-4a8d-8c0d-dd76da1f02a5"/>
+    <ds:schemaRef ds:uri="http://purl.org/dc/dcmitype/"/>
+    <ds:schemaRef ds:uri="http://schemas.microsoft.com/office/2006/documentManagement/types"/>
+    <ds:schemaRef ds:uri="http://schemas.microsoft.com/office/infopath/2007/PartnerControls"/>
+    <ds:schemaRef ds:uri="http://purl.org/dc/elements/1.1/"/>
+    <ds:schemaRef ds:uri="http://schemas.openxmlformats.org/package/2006/metadata/core-properties"/>
+    <ds:schemaRef ds:uri="16c05727-aa75-4e4a-9b5f-8a80a1165891"/>
+    <ds:schemaRef ds:uri="http://schemas.microsoft.com/office/2006/metadata/properties"/>
+    <ds:schemaRef ds:uri="http://www.w3.org/XML/1998/namespace"/>
+  </ds:schemaRefs>
+</ds:datastoreItem>
 </file>
</xml_diff>